<commit_message>
Latest version of slides in pptx format
</commit_message>
<xml_diff>
--- a/lpt_LISA.pptx
+++ b/lpt_LISA.pptx
@@ -16748,7 +16748,7 @@
         </p:spPr>
         <p:txBody>
           <a:bodyPr>
-            <a:normAutofit lnSpcReduction="10000"/>
+            <a:normAutofit/>
           </a:bodyPr>
           <a:lstStyle/>
           <a:p>
@@ -16831,13 +16831,6 @@
               </a:rPr>
               <a:t>prose.txt</a:t>
             </a:r>
-            <a:endParaRPr lang="en-US" sz="1800" b="1" dirty="0">
-              <a:latin typeface="Courier New" charset="0"/>
-              <a:ea typeface="Courier New" charset="0"/>
-              <a:cs typeface="Courier New" charset="0"/>
-            </a:endParaRPr>
-          </a:p>
-          <a:p>
             <a:endParaRPr lang="en-US" sz="1800" dirty="0"/>
           </a:p>
           <a:p>
@@ -16890,13 +16883,6 @@
               </a:rPr>
               <a:t>prose.txt</a:t>
             </a:r>
-            <a:endParaRPr lang="en-US" sz="1500" b="1" dirty="0">
-              <a:latin typeface="Courier New" charset="0"/>
-              <a:ea typeface="Courier New" charset="0"/>
-              <a:cs typeface="Courier New" charset="0"/>
-            </a:endParaRPr>
-          </a:p>
-          <a:p>
             <a:endParaRPr lang="en-US" sz="1800" dirty="0">
               <a:ea typeface="Courier New" charset="0"/>
               <a:cs typeface="Courier New" charset="0"/>
@@ -16936,9 +16922,90 @@
               </a:rPr>
               <a:t>history | grep '#success'</a:t>
             </a:r>
-          </a:p>
-          <a:p>
             <a:endParaRPr lang="en-US" sz="1800" dirty="0"/>
+          </a:p>
+          <a:p>
+            <a:r>
+              <a:rPr lang="en-US" sz="1800" dirty="0"/>
+              <a:t>Confirm you got an ambiguous spelling right</a:t>
+            </a:r>
+            <a:br>
+              <a:rPr lang="en-US" sz="1800" dirty="0"/>
+            </a:br>
+            <a:r>
+              <a:rPr lang="en-US" sz="1800" b="1" dirty="0">
+                <a:latin typeface="Courier New" panose="02070309020205020404" pitchFamily="49" charset="0"/>
+                <a:cs typeface="Courier New" panose="02070309020205020404" pitchFamily="49" charset="0"/>
+              </a:rPr>
+              <a:t>grep -E '^</a:t>
+            </a:r>
+            <a:r>
+              <a:rPr lang="en-US" sz="1800" b="1" dirty="0" err="1">
+                <a:latin typeface="Courier New" panose="02070309020205020404" pitchFamily="49" charset="0"/>
+                <a:cs typeface="Courier New" panose="02070309020205020404" pitchFamily="49" charset="0"/>
+              </a:rPr>
+              <a:t>ambig</a:t>
+            </a:r>
+            <a:r>
+              <a:rPr lang="en-US" sz="1800" b="1" dirty="0">
+                <a:latin typeface="Courier New" panose="02070309020205020404" pitchFamily="49" charset="0"/>
+                <a:cs typeface="Courier New" panose="02070309020205020404" pitchFamily="49" charset="0"/>
+              </a:rPr>
+              <a:t>(</a:t>
+            </a:r>
+            <a:r>
+              <a:rPr lang="en-US" sz="1800" b="1" dirty="0" err="1">
+                <a:latin typeface="Courier New" panose="02070309020205020404" pitchFamily="49" charset="0"/>
+                <a:cs typeface="Courier New" panose="02070309020205020404" pitchFamily="49" charset="0"/>
+              </a:rPr>
+              <a:t>uou|ou|ouo</a:t>
+            </a:r>
+            <a:r>
+              <a:rPr lang="en-US" sz="1800" b="1" dirty="0">
+                <a:latin typeface="Courier New" panose="02070309020205020404" pitchFamily="49" charset="0"/>
+                <a:cs typeface="Courier New" panose="02070309020205020404" pitchFamily="49" charset="0"/>
+              </a:rPr>
+              <a:t>)s$' /</a:t>
+            </a:r>
+            <a:r>
+              <a:rPr lang="en-US" sz="1800" b="1" dirty="0" err="1">
+                <a:latin typeface="Courier New" panose="02070309020205020404" pitchFamily="49" charset="0"/>
+                <a:cs typeface="Courier New" panose="02070309020205020404" pitchFamily="49" charset="0"/>
+              </a:rPr>
+              <a:t>usr</a:t>
+            </a:r>
+            <a:r>
+              <a:rPr lang="en-US" sz="1800" b="1" dirty="0">
+                <a:latin typeface="Courier New" panose="02070309020205020404" pitchFamily="49" charset="0"/>
+                <a:cs typeface="Courier New" panose="02070309020205020404" pitchFamily="49" charset="0"/>
+              </a:rPr>
+              <a:t>/share/</a:t>
+            </a:r>
+            <a:r>
+              <a:rPr lang="en-US" sz="1800" b="1" dirty="0" err="1">
+                <a:latin typeface="Courier New" panose="02070309020205020404" pitchFamily="49" charset="0"/>
+                <a:cs typeface="Courier New" panose="02070309020205020404" pitchFamily="49" charset="0"/>
+              </a:rPr>
+              <a:t>dict</a:t>
+            </a:r>
+            <a:r>
+              <a:rPr lang="en-US" sz="1800" b="1" dirty="0">
+                <a:latin typeface="Courier New" panose="02070309020205020404" pitchFamily="49" charset="0"/>
+                <a:cs typeface="Courier New" panose="02070309020205020404" pitchFamily="49" charset="0"/>
+              </a:rPr>
+              <a:t>/</a:t>
+            </a:r>
+            <a:r>
+              <a:rPr lang="en-US" sz="1800" b="1" dirty="0" err="1">
+                <a:latin typeface="Courier New" panose="02070309020205020404" pitchFamily="49" charset="0"/>
+                <a:cs typeface="Courier New" panose="02070309020205020404" pitchFamily="49" charset="0"/>
+              </a:rPr>
+              <a:t>linux.words</a:t>
+            </a:r>
+            <a:endParaRPr lang="en-US" sz="1800" b="1" dirty="0">
+              <a:latin typeface="Courier New" panose="02070309020205020404" pitchFamily="49" charset="0"/>
+              <a:cs typeface="Courier New" panose="02070309020205020404" pitchFamily="49" charset="0"/>
+            </a:endParaRPr>
           </a:p>
           <a:p>
             <a:r>
@@ -29950,7 +30017,9 @@
         </p:nvSpPr>
         <p:spPr/>
         <p:txBody>
-          <a:bodyPr/>
+          <a:bodyPr>
+            <a:normAutofit lnSpcReduction="10000"/>
+          </a:bodyPr>
           <a:lstStyle/>
           <a:p>
             <a:r>
@@ -29989,7 +30058,48 @@
           <a:p>
             <a:r>
               <a:rPr lang="en-US" dirty="0"/>
-              <a:t>Run small programs</a:t>
+              <a:t>Pretty print a json file</a:t>
+            </a:r>
+          </a:p>
+          <a:p>
+            <a:pPr lvl="1"/>
+            <a:r>
+              <a:rPr lang="en-US" b="1" dirty="0">
+                <a:latin typeface="Courier New" panose="02070309020205020404" pitchFamily="49" charset="0"/>
+                <a:cs typeface="Courier New" panose="02070309020205020404" pitchFamily="49" charset="0"/>
+              </a:rPr>
+              <a:t>python3 -m </a:t>
+            </a:r>
+            <a:r>
+              <a:rPr lang="en-US" b="1" dirty="0" err="1">
+                <a:latin typeface="Courier New" panose="02070309020205020404" pitchFamily="49" charset="0"/>
+                <a:cs typeface="Courier New" panose="02070309020205020404" pitchFamily="49" charset="0"/>
+              </a:rPr>
+              <a:t>json.tool</a:t>
+            </a:r>
+            <a:r>
+              <a:rPr lang="en-US" b="1" dirty="0">
+                <a:latin typeface="Courier New" panose="02070309020205020404" pitchFamily="49" charset="0"/>
+                <a:cs typeface="Courier New" panose="02070309020205020404" pitchFamily="49" charset="0"/>
+              </a:rPr>
+              <a:t> </a:t>
+            </a:r>
+            <a:r>
+              <a:rPr lang="en-US" b="1" dirty="0" err="1">
+                <a:latin typeface="Courier New" panose="02070309020205020404" pitchFamily="49" charset="0"/>
+                <a:cs typeface="Courier New" panose="02070309020205020404" pitchFamily="49" charset="0"/>
+              </a:rPr>
+              <a:t>afile.json</a:t>
+            </a:r>
+            <a:endParaRPr lang="en-US" b="1" dirty="0">
+              <a:latin typeface="Courier New" panose="02070309020205020404" pitchFamily="49" charset="0"/>
+              <a:cs typeface="Courier New" panose="02070309020205020404" pitchFamily="49" charset="0"/>
+            </a:endParaRPr>
+          </a:p>
+          <a:p>
+            <a:r>
+              <a:rPr lang="en-US" dirty="0"/>
+              <a:t>Run small python programs</a:t>
             </a:r>
           </a:p>
           <a:p>
@@ -30215,7 +30325,7 @@
         <p:spPr/>
         <p:txBody>
           <a:bodyPr>
-            <a:normAutofit lnSpcReduction="10000"/>
+            <a:normAutofit fontScale="92500" lnSpcReduction="10000"/>
           </a:bodyPr>
           <a:lstStyle/>
           <a:p>
@@ -30295,7 +30405,14 @@
                 <a:ea typeface="Courier New" charset="0"/>
                 <a:cs typeface="Courier New" charset="0"/>
               </a:rPr>
-              <a:t>yes </a:t>
+              <a:t>yes</a:t>
+            </a:r>
+            <a:r>
+              <a:rPr lang="en-US" b="1" dirty="0">
+                <a:ea typeface="Courier New" charset="0"/>
+                <a:cs typeface="Courier New" charset="0"/>
+              </a:rPr>
+              <a:t> </a:t>
             </a:r>
             <a:r>
               <a:rPr lang="en-US" dirty="0">
@@ -30334,11 +30451,22 @@
               </a:rPr>
               <a:t>testfile.txt</a:t>
             </a:r>
-            <a:endParaRPr lang="en-US" b="1" dirty="0">
-              <a:latin typeface="Courier New" charset="0"/>
-              <a:ea typeface="Courier New" charset="0"/>
-              <a:cs typeface="Courier New" charset="0"/>
-            </a:endParaRPr>
+            <a:r>
+              <a:rPr lang="en-US" b="1" dirty="0">
+                <a:latin typeface="Courier New" charset="0"/>
+                <a:ea typeface="Courier New" charset="0"/>
+                <a:cs typeface="Courier New" charset="0"/>
+              </a:rPr>
+              <a:t> </a:t>
+            </a:r>
+            <a:r>
+              <a:rPr lang="en-US" dirty="0">
+                <a:latin typeface="Courier New" charset="0"/>
+                <a:ea typeface="Courier New" charset="0"/>
+                <a:cs typeface="Courier New" charset="0"/>
+              </a:rPr>
+              <a:t># create file with arbitrary no. of lines</a:t>
+            </a:r>
           </a:p>
           <a:p>
             <a:r>
@@ -30535,7 +30663,7 @@
           <a:p>
             <a:r>
               <a:rPr lang="en-US" dirty="0"/>
-              <a:t>Run a command as a different group</a:t>
+              <a:t>Run a command as a different Linux group</a:t>
             </a:r>
           </a:p>
           <a:p>
@@ -30585,10 +30713,7 @@
               </a:rPr>
               <a:t>filename.csv</a:t>
             </a:r>
-            <a:endParaRPr lang="en-US" b="1" dirty="0">
-              <a:latin typeface="Courier New" panose="02070309020205020404" pitchFamily="49" charset="0"/>
-              <a:cs typeface="Courier New" panose="02070309020205020404" pitchFamily="49" charset="0"/>
-            </a:endParaRPr>
+            <a:endParaRPr lang="en-US" dirty="0"/>
           </a:p>
           <a:p>
             <a:r>
@@ -30637,73 +30762,12 @@
               <a:t> rand 8 -base64 | cut -c1-8 </a:t>
             </a:r>
             <a:r>
-              <a:rPr lang="en-US" sz="1700" dirty="0">
-                <a:latin typeface="Courier New" panose="02070309020205020404" pitchFamily="49" charset="0"/>
-                <a:cs typeface="Courier New" panose="02070309020205020404" pitchFamily="49" charset="0"/>
-              </a:rPr>
-              <a:t>#-base64 8 for some </a:t>
-            </a:r>
-            <a:r>
-              <a:rPr lang="en-US" sz="1700" dirty="0" err="1">
-                <a:latin typeface="Courier New" panose="02070309020205020404" pitchFamily="49" charset="0"/>
-                <a:cs typeface="Courier New" panose="02070309020205020404" pitchFamily="49" charset="0"/>
-              </a:rPr>
-              <a:t>vers</a:t>
-            </a:r>
-            <a:r>
-              <a:rPr lang="en-US" sz="1700" dirty="0">
-                <a:latin typeface="Courier New" panose="02070309020205020404" pitchFamily="49" charset="0"/>
-                <a:cs typeface="Courier New" panose="02070309020205020404" pitchFamily="49" charset="0"/>
-              </a:rPr>
-              <a:t> of </a:t>
-            </a:r>
-            <a:r>
-              <a:rPr lang="en-US" sz="1700" dirty="0" err="1">
-                <a:latin typeface="Courier New" panose="02070309020205020404" pitchFamily="49" charset="0"/>
-                <a:cs typeface="Courier New" panose="02070309020205020404" pitchFamily="49" charset="0"/>
-              </a:rPr>
-              <a:t>openssl</a:t>
-            </a:r>
-            <a:endParaRPr lang="en-US" sz="975" dirty="0">
-              <a:latin typeface="Courier New" panose="02070309020205020404" pitchFamily="49" charset="0"/>
-              <a:cs typeface="Courier New" panose="02070309020205020404" pitchFamily="49" charset="0"/>
-            </a:endParaRPr>
-          </a:p>
-          <a:p>
-            <a:pPr lvl="1"/>
-            <a:r>
-              <a:rPr lang="en-US" b="1" dirty="0" err="1">
-                <a:latin typeface="Courier New" panose="02070309020205020404" pitchFamily="49" charset="0"/>
-                <a:cs typeface="Courier New" panose="02070309020205020404" pitchFamily="49" charset="0"/>
-              </a:rPr>
-              <a:t>pwgen</a:t>
-            </a:r>
-            <a:r>
-              <a:rPr lang="en-US" b="1" dirty="0">
-                <a:latin typeface="Courier New" panose="02070309020205020404" pitchFamily="49" charset="0"/>
-                <a:cs typeface="Courier New" panose="02070309020205020404" pitchFamily="49" charset="0"/>
-              </a:rPr>
-              <a:t> </a:t>
-            </a:r>
-            <a:r>
-              <a:rPr lang="en-US" dirty="0">
-                <a:latin typeface="Courier New" panose="02070309020205020404" pitchFamily="49" charset="0"/>
-                <a:cs typeface="Courier New" panose="02070309020205020404" pitchFamily="49" charset="0"/>
-              </a:rPr>
-              <a:t># may not be available by default</a:t>
-            </a:r>
-            <a:br>
-              <a:rPr lang="en-US" dirty="0">
-                <a:latin typeface="Courier New" panose="02070309020205020404" pitchFamily="49" charset="0"/>
-                <a:cs typeface="Courier New" panose="02070309020205020404" pitchFamily="49" charset="0"/>
-              </a:rPr>
-            </a:br>
-            <a:endParaRPr lang="en-US" dirty="0">
-              <a:cs typeface="Courier New" panose="02070309020205020404" pitchFamily="49" charset="0"/>
-            </a:endParaRPr>
-          </a:p>
-          <a:p>
-            <a:endParaRPr lang="en-US" dirty="0"/>
+              <a:rPr lang="en-US" sz="1200" dirty="0">
+                <a:latin typeface="Courier New" panose="02070309020205020404" pitchFamily="49" charset="0"/>
+                <a:cs typeface="Courier New" panose="02070309020205020404" pitchFamily="49" charset="0"/>
+              </a:rPr>
+              <a:t>#-base64 8 for some versions</a:t>
+            </a:r>
           </a:p>
         </p:txBody>
       </p:sp>
@@ -31311,7 +31375,7 @@
           </a:p>
           <a:p>
             <a:r>
-              <a:rPr lang="en-US" dirty="0">
+              <a:rPr lang="en-US" dirty="0" err="1">
                 <a:hlinkClick r:id="rId6"/>
               </a:rPr>
               <a:t>wizardzines.com</a:t>
@@ -33051,42 +33115,47 @@
             </a:r>
           </a:p>
           <a:p>
+            <a:pPr marL="342900" lvl="1" indent="0">
+              <a:buNone/>
+            </a:pPr>
+            <a:r>
+              <a:rPr lang="en-US" dirty="0"/>
+              <a:t>Hints:</a:t>
+            </a:r>
+          </a:p>
+          <a:p>
             <a:pPr lvl="1"/>
-            <a:endParaRPr lang="en-US" dirty="0"/>
+            <a:r>
+              <a:rPr lang="en-US" dirty="0"/>
+              <a:t>Replace the </a:t>
+            </a:r>
+            <a:r>
+              <a:rPr lang="en-US" b="1" dirty="0">
+                <a:latin typeface="Courier New" panose="02070309020205020404" pitchFamily="49" charset="0"/>
+                <a:cs typeface="Courier New" panose="02070309020205020404" pitchFamily="49" charset="0"/>
+              </a:rPr>
+              <a:t>cut</a:t>
+            </a:r>
+            <a:r>
+              <a:rPr lang="en-US" dirty="0"/>
+              <a:t> commands with </a:t>
+            </a:r>
+            <a:r>
+              <a:rPr lang="en-US" b="1" dirty="0" err="1">
+                <a:latin typeface="Courier New" panose="02070309020205020404" pitchFamily="49" charset="0"/>
+                <a:cs typeface="Courier New" panose="02070309020205020404" pitchFamily="49" charset="0"/>
+              </a:rPr>
+              <a:t>awk</a:t>
+            </a:r>
+            <a:r>
+              <a:rPr lang="en-US" dirty="0"/>
+              <a:t> commands</a:t>
+            </a:r>
           </a:p>
           <a:p>
             <a:pPr lvl="1"/>
             <a:r>
               <a:rPr lang="en-US" dirty="0"/>
-              <a:t>Replace the </a:t>
-            </a:r>
-            <a:r>
-              <a:rPr lang="en-US" b="1" dirty="0">
-                <a:latin typeface="Courier New" panose="02070309020205020404" pitchFamily="49" charset="0"/>
-                <a:cs typeface="Courier New" panose="02070309020205020404" pitchFamily="49" charset="0"/>
-              </a:rPr>
-              <a:t>cut</a:t>
-            </a:r>
-            <a:r>
-              <a:rPr lang="en-US" dirty="0"/>
-              <a:t> commands with </a:t>
-            </a:r>
-            <a:r>
-              <a:rPr lang="en-US" b="1" dirty="0" err="1">
-                <a:latin typeface="Courier New" panose="02070309020205020404" pitchFamily="49" charset="0"/>
-                <a:cs typeface="Courier New" panose="02070309020205020404" pitchFamily="49" charset="0"/>
-              </a:rPr>
-              <a:t>awk</a:t>
-            </a:r>
-            <a:r>
-              <a:rPr lang="en-US" dirty="0"/>
-              <a:t> commands</a:t>
-            </a:r>
-          </a:p>
-          <a:p>
-            <a:pPr lvl="1"/>
-            <a:r>
-              <a:rPr lang="en-US" dirty="0"/>
               <a:t>Accommodate the </a:t>
             </a:r>
             <a:r>
@@ -33098,7 +33167,7 @@
             </a:r>
             <a:r>
               <a:rPr lang="en-US" dirty="0"/>
-              <a:t> with the </a:t>
+              <a:t> within </a:t>
             </a:r>
             <a:r>
               <a:rPr lang="en-US" b="1" dirty="0" err="1">
@@ -34379,7 +34448,7 @@
             </a:r>
             <a:r>
               <a:rPr lang="en-US" dirty="0"/>
-              <a:t> directory, add the contents presented in previous slides to it. How will you test if it works?</a:t>
+              <a:t> directory, make appropriate changes and add the contents presented in previous slides to it. How will you test if it works?</a:t>
             </a:r>
           </a:p>
           <a:p>

</xml_diff>

<commit_message>
added xxd hexdump utility
</commit_message>
<xml_diff>
--- a/lpt_LISA.pptx
+++ b/lpt_LISA.pptx
@@ -300,7 +300,7 @@
           <a:p>
             <a:fld id="{DE0C789A-1381-F54D-B55B-DCBB91319C08}" type="datetimeFigureOut">
               <a:rPr lang="en-US" smtClean="0"/>
-              <a:t>5/21/20</a:t>
+              <a:t>6/6/20</a:t>
             </a:fld>
             <a:endParaRPr lang="en-US"/>
           </a:p>
@@ -477,7 +477,7 @@
           <a:p>
             <a:fld id="{46CB9FDB-056B-6244-AE56-9549F1074EBB}" type="datetimeFigureOut">
               <a:rPr lang="en-US" smtClean="0"/>
-              <a:t>5/21/20</a:t>
+              <a:t>6/6/20</a:t>
             </a:fld>
             <a:endParaRPr lang="en-US"/>
           </a:p>
@@ -1957,7 +1957,7 @@
           <a:p>
             <a:fld id="{524F091B-C9FE-714F-8F5F-8CFB82A747F1}" type="datetime1">
               <a:rPr lang="en-US" smtClean="0"/>
-              <a:t>5/21/20</a:t>
+              <a:t>6/6/20</a:t>
             </a:fld>
             <a:endParaRPr lang="en-US"/>
           </a:p>
@@ -2127,7 +2127,7 @@
           <a:p>
             <a:fld id="{E5121F4C-BC13-F84F-9AD9-260A611D728C}" type="datetime1">
               <a:rPr lang="en-US" smtClean="0"/>
-              <a:t>5/21/20</a:t>
+              <a:t>6/6/20</a:t>
             </a:fld>
             <a:endParaRPr lang="en-US"/>
           </a:p>
@@ -2307,7 +2307,7 @@
           <a:p>
             <a:fld id="{69934431-5E8A-0144-AD3C-F9F3B5843812}" type="datetime1">
               <a:rPr lang="en-US" smtClean="0"/>
-              <a:t>5/21/20</a:t>
+              <a:t>6/6/20</a:t>
             </a:fld>
             <a:endParaRPr lang="en-US"/>
           </a:p>
@@ -2477,7 +2477,7 @@
           <a:p>
             <a:fld id="{4D966F88-1DAF-F94F-A3D2-93E7964825AC}" type="datetime1">
               <a:rPr lang="en-US" smtClean="0"/>
-              <a:t>5/21/20</a:t>
+              <a:t>6/6/20</a:t>
             </a:fld>
             <a:endParaRPr lang="en-US"/>
           </a:p>
@@ -2723,7 +2723,7 @@
           <a:p>
             <a:fld id="{75F67F5F-B354-5B41-A0FF-E33ACFB7B000}" type="datetime1">
               <a:rPr lang="en-US" smtClean="0"/>
-              <a:t>5/21/20</a:t>
+              <a:t>6/6/20</a:t>
             </a:fld>
             <a:endParaRPr lang="en-US"/>
           </a:p>
@@ -2955,7 +2955,7 @@
           <a:p>
             <a:fld id="{1FE71E3D-61C4-AF47-B5F6-80F7A2125094}" type="datetime1">
               <a:rPr lang="en-US" smtClean="0"/>
-              <a:t>5/21/20</a:t>
+              <a:t>6/6/20</a:t>
             </a:fld>
             <a:endParaRPr lang="en-US"/>
           </a:p>
@@ -3322,7 +3322,7 @@
           <a:p>
             <a:fld id="{B7259F95-3E7B-AE48-BD5A-55F4F48F15EE}" type="datetime1">
               <a:rPr lang="en-US" smtClean="0"/>
-              <a:t>5/21/20</a:t>
+              <a:t>6/6/20</a:t>
             </a:fld>
             <a:endParaRPr lang="en-US"/>
           </a:p>
@@ -3440,7 +3440,7 @@
           <a:p>
             <a:fld id="{1E2D71D9-286E-D847-8194-60F3E909E40C}" type="datetime1">
               <a:rPr lang="en-US" smtClean="0"/>
-              <a:t>5/21/20</a:t>
+              <a:t>6/6/20</a:t>
             </a:fld>
             <a:endParaRPr lang="en-US"/>
           </a:p>
@@ -3535,7 +3535,7 @@
           <a:p>
             <a:fld id="{3AC70D76-DA63-C342-B98E-F532027F9CD7}" type="datetime1">
               <a:rPr lang="en-US" smtClean="0"/>
-              <a:t>5/21/20</a:t>
+              <a:t>6/6/20</a:t>
             </a:fld>
             <a:endParaRPr lang="en-US"/>
           </a:p>
@@ -3812,7 +3812,7 @@
           <a:p>
             <a:fld id="{74E169E1-67F4-DE43-8AD1-CF716A32D6D9}" type="datetime1">
               <a:rPr lang="en-US" smtClean="0"/>
-              <a:t>5/21/20</a:t>
+              <a:t>6/6/20</a:t>
             </a:fld>
             <a:endParaRPr lang="en-US"/>
           </a:p>
@@ -4069,7 +4069,7 @@
           <a:p>
             <a:fld id="{EDBC0E13-B072-744E-A1EF-1258C23FD22F}" type="datetime1">
               <a:rPr lang="en-US" smtClean="0"/>
-              <a:t>5/21/20</a:t>
+              <a:t>6/6/20</a:t>
             </a:fld>
             <a:endParaRPr lang="en-US"/>
           </a:p>
@@ -4282,7 +4282,7 @@
           <a:p>
             <a:fld id="{14D54490-4A22-8B41-9AA4-9BECA28CBC89}" type="datetime1">
               <a:rPr lang="en-US" smtClean="0"/>
-              <a:t>5/21/20</a:t>
+              <a:t>6/6/20</a:t>
             </a:fld>
             <a:endParaRPr lang="en-US"/>
           </a:p>
@@ -30657,7 +30657,7 @@
         <p:spPr/>
         <p:txBody>
           <a:bodyPr>
-            <a:normAutofit/>
+            <a:normAutofit lnSpcReduction="10000"/>
           </a:bodyPr>
           <a:lstStyle/>
           <a:p>
@@ -30718,6 +30718,116 @@
           <a:p>
             <a:r>
               <a:rPr lang="en-US" dirty="0"/>
+              <a:t>Have difficulty sending binary executables over emails?</a:t>
+            </a:r>
+          </a:p>
+          <a:p>
+            <a:pPr lvl="1"/>
+            <a:r>
+              <a:rPr lang="en-US" b="1" dirty="0" err="1">
+                <a:latin typeface="Courier New" panose="02070309020205020404" pitchFamily="49" charset="0"/>
+                <a:cs typeface="Courier New" panose="02070309020205020404" pitchFamily="49" charset="0"/>
+              </a:rPr>
+              <a:t>xxd</a:t>
+            </a:r>
+            <a:r>
+              <a:rPr lang="en-US" b="1" dirty="0">
+                <a:latin typeface="Courier New" panose="02070309020205020404" pitchFamily="49" charset="0"/>
+                <a:cs typeface="Courier New" panose="02070309020205020404" pitchFamily="49" charset="0"/>
+              </a:rPr>
+              <a:t> </a:t>
+            </a:r>
+            <a:r>
+              <a:rPr lang="en-US" b="1" dirty="0" err="1">
+                <a:latin typeface="Courier New" panose="02070309020205020404" pitchFamily="49" charset="0"/>
+                <a:cs typeface="Courier New" panose="02070309020205020404" pitchFamily="49" charset="0"/>
+              </a:rPr>
+              <a:t>f.exe</a:t>
+            </a:r>
+            <a:r>
+              <a:rPr lang="en-US" b="1" dirty="0">
+                <a:latin typeface="Courier New" panose="02070309020205020404" pitchFamily="49" charset="0"/>
+                <a:cs typeface="Courier New" panose="02070309020205020404" pitchFamily="49" charset="0"/>
+              </a:rPr>
+              <a:t> </a:t>
+            </a:r>
+            <a:r>
+              <a:rPr lang="en-US" b="1" dirty="0" err="1">
+                <a:latin typeface="Courier New" panose="02070309020205020404" pitchFamily="49" charset="0"/>
+                <a:cs typeface="Courier New" panose="02070309020205020404" pitchFamily="49" charset="0"/>
+              </a:rPr>
+              <a:t>f.hex</a:t>
+            </a:r>
+            <a:r>
+              <a:rPr lang="en-US" b="1" dirty="0">
+                <a:latin typeface="Courier New" panose="02070309020205020404" pitchFamily="49" charset="0"/>
+                <a:cs typeface="Courier New" panose="02070309020205020404" pitchFamily="49" charset="0"/>
+              </a:rPr>
+              <a:t> # </a:t>
+            </a:r>
+            <a:r>
+              <a:rPr lang="en-US" b="1" dirty="0" err="1">
+                <a:latin typeface="Courier New" panose="02070309020205020404" pitchFamily="49" charset="0"/>
+                <a:cs typeface="Courier New" panose="02070309020205020404" pitchFamily="49" charset="0"/>
+              </a:rPr>
+              <a:t>hexdump</a:t>
+            </a:r>
+            <a:r>
+              <a:rPr lang="en-US" b="1" dirty="0">
+                <a:latin typeface="Courier New" panose="02070309020205020404" pitchFamily="49" charset="0"/>
+                <a:cs typeface="Courier New" panose="02070309020205020404" pitchFamily="49" charset="0"/>
+              </a:rPr>
+              <a:t> the exe, send over email</a:t>
+            </a:r>
+          </a:p>
+          <a:p>
+            <a:pPr lvl="1"/>
+            <a:r>
+              <a:rPr lang="en-US" b="1" dirty="0" err="1">
+                <a:latin typeface="Courier New" panose="02070309020205020404" pitchFamily="49" charset="0"/>
+                <a:cs typeface="Courier New" panose="02070309020205020404" pitchFamily="49" charset="0"/>
+              </a:rPr>
+              <a:t>xxd</a:t>
+            </a:r>
+            <a:r>
+              <a:rPr lang="en-US" b="1" dirty="0">
+                <a:latin typeface="Courier New" panose="02070309020205020404" pitchFamily="49" charset="0"/>
+                <a:cs typeface="Courier New" panose="02070309020205020404" pitchFamily="49" charset="0"/>
+              </a:rPr>
+              <a:t> -r </a:t>
+            </a:r>
+            <a:r>
+              <a:rPr lang="en-US" b="1" dirty="0" err="1">
+                <a:latin typeface="Courier New" panose="02070309020205020404" pitchFamily="49" charset="0"/>
+                <a:cs typeface="Courier New" panose="02070309020205020404" pitchFamily="49" charset="0"/>
+              </a:rPr>
+              <a:t>f.hex</a:t>
+            </a:r>
+            <a:r>
+              <a:rPr lang="en-US" b="1" dirty="0">
+                <a:latin typeface="Courier New" panose="02070309020205020404" pitchFamily="49" charset="0"/>
+                <a:cs typeface="Courier New" panose="02070309020205020404" pitchFamily="49" charset="0"/>
+              </a:rPr>
+              <a:t> </a:t>
+            </a:r>
+            <a:r>
+              <a:rPr lang="en-US" b="1" dirty="0" err="1">
+                <a:latin typeface="Courier New" panose="02070309020205020404" pitchFamily="49" charset="0"/>
+                <a:cs typeface="Courier New" panose="02070309020205020404" pitchFamily="49" charset="0"/>
+              </a:rPr>
+              <a:t>f.exe</a:t>
+            </a:r>
+            <a:r>
+              <a:rPr lang="en-US" b="1" dirty="0">
+                <a:latin typeface="Courier New" panose="02070309020205020404" pitchFamily="49" charset="0"/>
+                <a:cs typeface="Courier New" panose="02070309020205020404" pitchFamily="49" charset="0"/>
+              </a:rPr>
+              <a:t> # receiver convert back to exe</a:t>
+            </a:r>
+          </a:p>
+          <a:p>
+            <a:r>
+              <a:rPr lang="en-US" dirty="0"/>
               <a:t>Generate password</a:t>
             </a:r>
           </a:p>
@@ -30766,7 +30876,7 @@
                 <a:latin typeface="Courier New" panose="02070309020205020404" pitchFamily="49" charset="0"/>
                 <a:cs typeface="Courier New" panose="02070309020205020404" pitchFamily="49" charset="0"/>
               </a:rPr>
-              <a:t>#-base64 8 for some versions</a:t>
+              <a:t>#-base64 8 for some version</a:t>
             </a:r>
           </a:p>
         </p:txBody>

</xml_diff>

<commit_message>
Updated ssh config: included ProxyJump
</commit_message>
<xml_diff>
--- a/lpt_LISA.pptx
+++ b/lpt_LISA.pptx
@@ -21632,12 +21632,20 @@
               <a:t> kill-session -t </a:t>
             </a:r>
             <a:r>
-              <a:rPr lang="en-US" sz="1500" b="1">
-                <a:latin typeface="Courier New" charset="0"/>
-                <a:ea typeface="Courier New" charset="0"/>
-                <a:cs typeface="Courier New" charset="0"/>
-              </a:rPr>
-              <a:t>mysession </a:t>
+              <a:rPr lang="en-US" sz="1500" b="1" dirty="0" err="1">
+                <a:latin typeface="Courier New" charset="0"/>
+                <a:ea typeface="Courier New" charset="0"/>
+                <a:cs typeface="Courier New" charset="0"/>
+              </a:rPr>
+              <a:t>mysession</a:t>
+            </a:r>
+            <a:r>
+              <a:rPr lang="en-US" sz="1500" b="1" dirty="0">
+                <a:latin typeface="Courier New" charset="0"/>
+                <a:ea typeface="Courier New" charset="0"/>
+                <a:cs typeface="Courier New" charset="0"/>
+              </a:rPr>
+              <a:t> </a:t>
             </a:r>
             <a:r>
               <a:rPr lang="en-US" sz="1500" dirty="0">
@@ -22587,7 +22595,18 @@
                 <a:ea typeface="Courier New" charset="0"/>
                 <a:cs typeface="Courier New" charset="0"/>
               </a:rPr>
-              <a:t>Host summit</a:t>
+              <a:t>Host </a:t>
+            </a:r>
+            <a:r>
+              <a:rPr lang="en-US" sz="1500" b="1" dirty="0">
+                <a:solidFill>
+                  <a:schemeClr val="accent2"/>
+                </a:solidFill>
+                <a:latin typeface="Courier New" charset="0"/>
+                <a:ea typeface="Courier New" charset="0"/>
+                <a:cs typeface="Courier New" charset="0"/>
+              </a:rPr>
+              <a:t>login1</a:t>
             </a:r>
             <a:br>
               <a:rPr lang="en-US" sz="1500" b="1" dirty="0">
@@ -22602,7 +22621,7 @@
                 <a:ea typeface="Courier New" charset="0"/>
                 <a:cs typeface="Courier New" charset="0"/>
               </a:rPr>
-              <a:t>  Port 22</a:t>
+              <a:t>  hostname login1.ornl.gov</a:t>
             </a:r>
             <a:br>
               <a:rPr lang="en-US" sz="1500" b="1" dirty="0">
@@ -22617,92 +22636,7 @@
                 <a:ea typeface="Courier New" charset="0"/>
                 <a:cs typeface="Courier New" charset="0"/>
               </a:rPr>
-              <a:t>  hostname </a:t>
-            </a:r>
-            <a:r>
-              <a:rPr lang="en-US" sz="1500" b="1" dirty="0" err="1">
-                <a:latin typeface="Courier New" charset="0"/>
-                <a:ea typeface="Courier New" charset="0"/>
-                <a:cs typeface="Courier New" charset="0"/>
-              </a:rPr>
-              <a:t>summit.olcf.ornl.gov</a:t>
-            </a:r>
-            <a:br>
-              <a:rPr lang="en-US" sz="1500" b="1" dirty="0">
-                <a:latin typeface="Courier New" charset="0"/>
-                <a:ea typeface="Courier New" charset="0"/>
-                <a:cs typeface="Courier New" charset="0"/>
-              </a:rPr>
-            </a:br>
-            <a:r>
-              <a:rPr lang="en-US" sz="1500" b="1" dirty="0">
-                <a:latin typeface="Courier New" charset="0"/>
-                <a:ea typeface="Courier New" charset="0"/>
-                <a:cs typeface="Courier New" charset="0"/>
-              </a:rPr>
-              <a:t>  User ketan2</a:t>
-            </a:r>
-            <a:br>
-              <a:rPr lang="en-US" sz="1500" b="1" dirty="0">
-                <a:latin typeface="Courier New" charset="0"/>
-                <a:ea typeface="Courier New" charset="0"/>
-                <a:cs typeface="Courier New" charset="0"/>
-              </a:rPr>
-            </a:br>
-            <a:r>
-              <a:rPr lang="en-US" sz="1500" b="1" dirty="0">
-                <a:latin typeface="Courier New" charset="0"/>
-                <a:ea typeface="Courier New" charset="0"/>
-                <a:cs typeface="Courier New" charset="0"/>
-              </a:rPr>
-              <a:t>  </a:t>
-            </a:r>
-            <a:r>
-              <a:rPr lang="en-US" sz="1500" b="1" dirty="0" err="1">
-                <a:latin typeface="Courier New" charset="0"/>
-                <a:ea typeface="Courier New" charset="0"/>
-                <a:cs typeface="Courier New" charset="0"/>
-              </a:rPr>
-              <a:t>ServerAliveCountMax</a:t>
-            </a:r>
-            <a:r>
-              <a:rPr lang="en-US" sz="1500" b="1" dirty="0">
-                <a:latin typeface="Courier New" charset="0"/>
-                <a:ea typeface="Courier New" charset="0"/>
-                <a:cs typeface="Courier New" charset="0"/>
-              </a:rPr>
-              <a:t>=3 #max num of alive messages sent without ack</a:t>
-            </a:r>
-            <a:br>
-              <a:rPr lang="en-US" sz="1500" b="1" dirty="0">
-                <a:latin typeface="Courier New" charset="0"/>
-                <a:ea typeface="Courier New" charset="0"/>
-                <a:cs typeface="Courier New" charset="0"/>
-              </a:rPr>
-            </a:br>
-            <a:r>
-              <a:rPr lang="en-US" sz="1500" b="1" dirty="0">
-                <a:latin typeface="Courier New" charset="0"/>
-                <a:ea typeface="Courier New" charset="0"/>
-                <a:cs typeface="Courier New" charset="0"/>
-              </a:rPr>
-              <a:t>  </a:t>
-            </a:r>
-            <a:r>
-              <a:rPr lang="en-US" sz="1500" b="1" dirty="0" err="1">
-                <a:latin typeface="Courier New" charset="0"/>
-                <a:ea typeface="Courier New" charset="0"/>
-                <a:cs typeface="Courier New" charset="0"/>
-              </a:rPr>
-              <a:t>ServerAliveInterval</a:t>
-            </a:r>
-            <a:r>
-              <a:rPr lang="en-US" sz="1500" b="1" dirty="0">
-                <a:latin typeface="Courier New" charset="0"/>
-                <a:ea typeface="Courier New" charset="0"/>
-                <a:cs typeface="Courier New" charset="0"/>
-              </a:rPr>
-              <a:t>=15 #send a null message every 15 sec</a:t>
+              <a:t>  User km0</a:t>
             </a:r>
             <a:br>
               <a:rPr lang="en-US" sz="1500" b="1" dirty="0">
@@ -22754,7 +22688,23 @@
                 <a:ea typeface="Courier New" charset="0"/>
                 <a:cs typeface="Courier New" charset="0"/>
               </a:rPr>
-              <a:t> hostname or-condo-</a:t>
+              <a:t> hostname or-</a:t>
+            </a:r>
+            <a:r>
+              <a:rPr lang="en-US" sz="1500" b="1" dirty="0" err="1">
+                <a:latin typeface="Courier New" charset="0"/>
+                <a:ea typeface="Courier New" charset="0"/>
+                <a:cs typeface="Courier New" charset="0"/>
+              </a:rPr>
+              <a:t>slurm</a:t>
+            </a:r>
+            <a:r>
+              <a:rPr lang="en-US" sz="1500" b="1" dirty="0">
+                <a:latin typeface="Courier New" charset="0"/>
+                <a:ea typeface="Courier New" charset="0"/>
+                <a:cs typeface="Courier New" charset="0"/>
+              </a:rPr>
+              <a:t>-</a:t>
             </a:r>
             <a:r>
               <a:rPr lang="en-US" sz="1500" b="1" dirty="0" err="1">
@@ -22785,7 +22735,34 @@
                 <a:ea typeface="Courier New" charset="0"/>
                 <a:cs typeface="Courier New" charset="0"/>
               </a:rPr>
-              <a:t> User km0</a:t>
+              <a:t> </a:t>
+            </a:r>
+            <a:r>
+              <a:rPr lang="en-US" sz="1500" b="1" dirty="0" err="1">
+                <a:latin typeface="Courier New" charset="0"/>
+                <a:ea typeface="Courier New" charset="0"/>
+                <a:cs typeface="Courier New" charset="0"/>
+              </a:rPr>
+              <a:t>ProxyJump</a:t>
+            </a:r>
+            <a:r>
+              <a:rPr lang="en-US" sz="1500" b="1" dirty="0">
+                <a:latin typeface="Courier New" charset="0"/>
+                <a:ea typeface="Courier New" charset="0"/>
+                <a:cs typeface="Courier New" charset="0"/>
+              </a:rPr>
+              <a:t> </a:t>
+            </a:r>
+            <a:r>
+              <a:rPr lang="en-US" sz="1500" b="1" dirty="0">
+                <a:solidFill>
+                  <a:schemeClr val="accent2"/>
+                </a:solidFill>
+                <a:latin typeface="Courier New" charset="0"/>
+                <a:ea typeface="Courier New" charset="0"/>
+                <a:cs typeface="Courier New" charset="0"/>
+              </a:rPr>
+              <a:t>login1</a:t>
             </a:r>
             <a:br>
               <a:rPr lang="en-US" sz="1500" b="1" dirty="0">
@@ -22800,23 +22777,7 @@
                 <a:ea typeface="Courier New" charset="0"/>
                 <a:cs typeface="Courier New" charset="0"/>
               </a:rPr>
-              <a:t> </a:t>
-            </a:r>
-            <a:r>
-              <a:rPr lang="en-US" sz="1500" b="1" dirty="0" err="1">
-                <a:latin typeface="Courier New" charset="0"/>
-                <a:ea typeface="Courier New" charset="0"/>
-                <a:cs typeface="Courier New" charset="0"/>
-              </a:rPr>
-              <a:t>ServerAliveCountMax</a:t>
-            </a:r>
-            <a:r>
-              <a:rPr lang="en-US" sz="1500" b="1" dirty="0">
-                <a:latin typeface="Courier New" charset="0"/>
-                <a:ea typeface="Courier New" charset="0"/>
-                <a:cs typeface="Courier New" charset="0"/>
-              </a:rPr>
-              <a:t>=3</a:t>
+              <a:t> User km0</a:t>
             </a:r>
             <a:br>
               <a:rPr lang="en-US" sz="1500" b="1" dirty="0">
@@ -22839,7 +22800,7 @@
                 <a:ea typeface="Courier New" charset="0"/>
                 <a:cs typeface="Courier New" charset="0"/>
               </a:rPr>
-              <a:t>ServerAliveInterval</a:t>
+              <a:t>ServerAliveCountMax</a:t>
             </a:r>
             <a:r>
               <a:rPr lang="en-US" sz="1500" b="1" dirty="0">
@@ -22847,7 +22808,15 @@
                 <a:ea typeface="Courier New" charset="0"/>
                 <a:cs typeface="Courier New" charset="0"/>
               </a:rPr>
-              <a:t>=15</a:t>
+              <a:t>=3 </a:t>
+            </a:r>
+            <a:r>
+              <a:rPr lang="en-US" sz="1500" dirty="0">
+                <a:latin typeface="Courier New" charset="0"/>
+                <a:ea typeface="Courier New" charset="0"/>
+                <a:cs typeface="Courier New" charset="0"/>
+              </a:rPr>
+              <a:t>#max num of alive messages sent without ack</a:t>
             </a:r>
             <a:br>
               <a:rPr lang="en-US" sz="1500" b="1" dirty="0">
@@ -22856,6 +22825,60 @@
                 <a:cs typeface="Courier New" charset="0"/>
               </a:rPr>
             </a:br>
+            <a:r>
+              <a:rPr lang="en-US" sz="1500" b="1" dirty="0">
+                <a:latin typeface="Courier New" charset="0"/>
+                <a:ea typeface="Courier New" charset="0"/>
+                <a:cs typeface="Courier New" charset="0"/>
+              </a:rPr>
+              <a:t> </a:t>
+            </a:r>
+            <a:r>
+              <a:rPr lang="en-US" sz="1500" b="1" dirty="0" err="1">
+                <a:latin typeface="Courier New" charset="0"/>
+                <a:ea typeface="Courier New" charset="0"/>
+                <a:cs typeface="Courier New" charset="0"/>
+              </a:rPr>
+              <a:t>ServerAliveInterval</a:t>
+            </a:r>
+            <a:r>
+              <a:rPr lang="en-US" sz="1500" b="1" dirty="0">
+                <a:latin typeface="Courier New" charset="0"/>
+                <a:ea typeface="Courier New" charset="0"/>
+                <a:cs typeface="Courier New" charset="0"/>
+              </a:rPr>
+              <a:t>=15 </a:t>
+            </a:r>
+            <a:r>
+              <a:rPr lang="en-US" sz="1500" dirty="0">
+                <a:latin typeface="Courier New" charset="0"/>
+                <a:ea typeface="Courier New" charset="0"/>
+                <a:cs typeface="Courier New" charset="0"/>
+              </a:rPr>
+              <a:t>#send a null message every 15 sec</a:t>
+            </a:r>
+            <a:br>
+              <a:rPr lang="en-US" sz="1500" dirty="0">
+                <a:latin typeface="Courier New" charset="0"/>
+                <a:ea typeface="Courier New" charset="0"/>
+                <a:cs typeface="Courier New" charset="0"/>
+              </a:rPr>
+            </a:br>
+            <a:br>
+              <a:rPr lang="en-US" sz="1500" b="1" dirty="0">
+                <a:latin typeface="Courier New" charset="0"/>
+                <a:ea typeface="Courier New" charset="0"/>
+                <a:cs typeface="Courier New" charset="0"/>
+              </a:rPr>
+            </a:br>
+            <a:r>
+              <a:rPr lang="en-US" sz="1500" b="1" dirty="0">
+                <a:latin typeface="Courier New" charset="0"/>
+                <a:ea typeface="Courier New" charset="0"/>
+                <a:cs typeface="Courier New" charset="0"/>
+              </a:rPr>
+              <a:t> </a:t>
+            </a:r>
             <a:br>
               <a:rPr lang="en-US" sz="1500" b="1" dirty="0">
                 <a:latin typeface="Courier New" charset="0"/>
@@ -24676,7 +24699,7 @@
               <a:t>: run curl </a:t>
             </a:r>
             <a:r>
-              <a:rPr lang="en-US" dirty="0" err="1"/>
+              <a:rPr lang="en-US" i="1" dirty="0" err="1"/>
               <a:t>iff</a:t>
             </a:r>
             <a:r>
@@ -24710,7 +24733,7 @@
               <a:t>: test </a:t>
             </a:r>
             <a:r>
-              <a:rPr lang="en-US" dirty="0" err="1"/>
+              <a:rPr lang="en-US" i="1" dirty="0" err="1"/>
               <a:t>iff</a:t>
             </a:r>
             <a:r>

</xml_diff>

<commit_message>
fixes in the make section
</commit_message>
<xml_diff>
--- a/lpt_LISA.pptx
+++ b/lpt_LISA.pptx
@@ -314,7 +314,7 @@
           <a:p>
             <a:fld id="{DE0C789A-1381-F54D-B55B-DCBB91319C08}" type="datetimeFigureOut">
               <a:rPr lang="en-US" smtClean="0"/>
-              <a:t>6/29/20</a:t>
+              <a:t>7/2/20</a:t>
             </a:fld>
             <a:endParaRPr lang="en-US"/>
           </a:p>
@@ -491,7 +491,7 @@
           <a:p>
             <a:fld id="{46CB9FDB-056B-6244-AE56-9549F1074EBB}" type="datetimeFigureOut">
               <a:rPr lang="en-US" smtClean="0"/>
-              <a:t>6/29/20</a:t>
+              <a:t>7/2/20</a:t>
             </a:fld>
             <a:endParaRPr lang="en-US"/>
           </a:p>
@@ -886,6 +886,90 @@
           <a:bodyPr/>
           <a:lstStyle/>
           <a:p>
+            <a:endParaRPr lang="en-US" dirty="0"/>
+          </a:p>
+        </p:txBody>
+      </p:sp>
+      <p:sp>
+        <p:nvSpPr>
+          <p:cNvPr id="4" name="Slide Number Placeholder 3"/>
+          <p:cNvSpPr>
+            <a:spLocks noGrp="1"/>
+          </p:cNvSpPr>
+          <p:nvPr>
+            <p:ph type="sldNum" sz="quarter" idx="5"/>
+          </p:nvPr>
+        </p:nvSpPr>
+        <p:spPr/>
+        <p:txBody>
+          <a:bodyPr/>
+          <a:lstStyle/>
+          <a:p>
+            <a:fld id="{D97B2049-7013-B143-AD62-F7BCB3DA4A6F}" type="slidenum">
+              <a:rPr lang="en-US" smtClean="0"/>
+              <a:t>80</a:t>
+            </a:fld>
+            <a:endParaRPr lang="en-US"/>
+          </a:p>
+        </p:txBody>
+      </p:sp>
+    </p:spTree>
+    <p:extLst>
+      <p:ext uri="{BB962C8B-B14F-4D97-AF65-F5344CB8AC3E}">
+        <p14:creationId xmlns:p14="http://schemas.microsoft.com/office/powerpoint/2010/main" val="51113427"/>
+      </p:ext>
+    </p:extLst>
+  </p:cSld>
+  <p:clrMapOvr>
+    <a:masterClrMapping/>
+  </p:clrMapOvr>
+</p:notes>
+</file>
+
+<file path=ppt/notesSlides/notesSlide11.xml><?xml version="1.0" encoding="utf-8"?>
+<p:notes xmlns:a="http://schemas.openxmlformats.org/drawingml/2006/main" xmlns:r="http://schemas.openxmlformats.org/officeDocument/2006/relationships" xmlns:p="http://schemas.openxmlformats.org/presentationml/2006/main">
+  <p:cSld>
+    <p:spTree>
+      <p:nvGrpSpPr>
+        <p:cNvPr id="1" name=""/>
+        <p:cNvGrpSpPr/>
+        <p:nvPr/>
+      </p:nvGrpSpPr>
+      <p:grpSpPr>
+        <a:xfrm>
+          <a:off x="0" y="0"/>
+          <a:ext cx="0" cy="0"/>
+          <a:chOff x="0" y="0"/>
+          <a:chExt cx="0" cy="0"/>
+        </a:xfrm>
+      </p:grpSpPr>
+      <p:sp>
+        <p:nvSpPr>
+          <p:cNvPr id="2" name="Slide Image Placeholder 1"/>
+          <p:cNvSpPr>
+            <a:spLocks noGrp="1" noRot="1" noChangeAspect="1"/>
+          </p:cNvSpPr>
+          <p:nvPr>
+            <p:ph type="sldImg"/>
+          </p:nvPr>
+        </p:nvSpPr>
+        <p:spPr/>
+      </p:sp>
+      <p:sp>
+        <p:nvSpPr>
+          <p:cNvPr id="3" name="Notes Placeholder 2"/>
+          <p:cNvSpPr>
+            <a:spLocks noGrp="1"/>
+          </p:cNvSpPr>
+          <p:nvPr>
+            <p:ph type="body" idx="1"/>
+          </p:nvPr>
+        </p:nvSpPr>
+        <p:spPr/>
+        <p:txBody>
+          <a:bodyPr/>
+          <a:lstStyle/>
+          <a:p>
             <a:r>
               <a:rPr lang="en-US" dirty="0"/>
               <a:t>http://</a:t>
@@ -1971,7 +2055,7 @@
           <a:p>
             <a:fld id="{524F091B-C9FE-714F-8F5F-8CFB82A747F1}" type="datetime1">
               <a:rPr lang="en-US" smtClean="0"/>
-              <a:t>6/29/20</a:t>
+              <a:t>7/2/20</a:t>
             </a:fld>
             <a:endParaRPr lang="en-US"/>
           </a:p>
@@ -2141,7 +2225,7 @@
           <a:p>
             <a:fld id="{E5121F4C-BC13-F84F-9AD9-260A611D728C}" type="datetime1">
               <a:rPr lang="en-US" smtClean="0"/>
-              <a:t>6/29/20</a:t>
+              <a:t>7/2/20</a:t>
             </a:fld>
             <a:endParaRPr lang="en-US"/>
           </a:p>
@@ -2321,7 +2405,7 @@
           <a:p>
             <a:fld id="{69934431-5E8A-0144-AD3C-F9F3B5843812}" type="datetime1">
               <a:rPr lang="en-US" smtClean="0"/>
-              <a:t>6/29/20</a:t>
+              <a:t>7/2/20</a:t>
             </a:fld>
             <a:endParaRPr lang="en-US"/>
           </a:p>
@@ -2491,7 +2575,7 @@
           <a:p>
             <a:fld id="{4D966F88-1DAF-F94F-A3D2-93E7964825AC}" type="datetime1">
               <a:rPr lang="en-US" smtClean="0"/>
-              <a:t>6/29/20</a:t>
+              <a:t>7/2/20</a:t>
             </a:fld>
             <a:endParaRPr lang="en-US"/>
           </a:p>
@@ -2737,7 +2821,7 @@
           <a:p>
             <a:fld id="{75F67F5F-B354-5B41-A0FF-E33ACFB7B000}" type="datetime1">
               <a:rPr lang="en-US" smtClean="0"/>
-              <a:t>6/29/20</a:t>
+              <a:t>7/2/20</a:t>
             </a:fld>
             <a:endParaRPr lang="en-US"/>
           </a:p>
@@ -2969,7 +3053,7 @@
           <a:p>
             <a:fld id="{1FE71E3D-61C4-AF47-B5F6-80F7A2125094}" type="datetime1">
               <a:rPr lang="en-US" smtClean="0"/>
-              <a:t>6/29/20</a:t>
+              <a:t>7/2/20</a:t>
             </a:fld>
             <a:endParaRPr lang="en-US"/>
           </a:p>
@@ -3336,7 +3420,7 @@
           <a:p>
             <a:fld id="{B7259F95-3E7B-AE48-BD5A-55F4F48F15EE}" type="datetime1">
               <a:rPr lang="en-US" smtClean="0"/>
-              <a:t>6/29/20</a:t>
+              <a:t>7/2/20</a:t>
             </a:fld>
             <a:endParaRPr lang="en-US"/>
           </a:p>
@@ -3454,7 +3538,7 @@
           <a:p>
             <a:fld id="{1E2D71D9-286E-D847-8194-60F3E909E40C}" type="datetime1">
               <a:rPr lang="en-US" smtClean="0"/>
-              <a:t>6/29/20</a:t>
+              <a:t>7/2/20</a:t>
             </a:fld>
             <a:endParaRPr lang="en-US"/>
           </a:p>
@@ -3549,7 +3633,7 @@
           <a:p>
             <a:fld id="{3AC70D76-DA63-C342-B98E-F532027F9CD7}" type="datetime1">
               <a:rPr lang="en-US" smtClean="0"/>
-              <a:t>6/29/20</a:t>
+              <a:t>7/2/20</a:t>
             </a:fld>
             <a:endParaRPr lang="en-US"/>
           </a:p>
@@ -3826,7 +3910,7 @@
           <a:p>
             <a:fld id="{74E169E1-67F4-DE43-8AD1-CF716A32D6D9}" type="datetime1">
               <a:rPr lang="en-US" smtClean="0"/>
-              <a:t>6/29/20</a:t>
+              <a:t>7/2/20</a:t>
             </a:fld>
             <a:endParaRPr lang="en-US"/>
           </a:p>
@@ -4083,7 +4167,7 @@
           <a:p>
             <a:fld id="{EDBC0E13-B072-744E-A1EF-1258C23FD22F}" type="datetime1">
               <a:rPr lang="en-US" smtClean="0"/>
-              <a:t>6/29/20</a:t>
+              <a:t>7/2/20</a:t>
             </a:fld>
             <a:endParaRPr lang="en-US"/>
           </a:p>
@@ -4296,7 +4380,7 @@
           <a:p>
             <a:fld id="{14D54490-4A22-8B41-9AA4-9BECA28CBC89}" type="datetime1">
               <a:rPr lang="en-US" smtClean="0"/>
-              <a:t>6/29/20</a:t>
+              <a:t>7/2/20</a:t>
             </a:fld>
             <a:endParaRPr lang="en-US"/>
           </a:p>
@@ -32148,7 +32232,7 @@
               <a:rPr lang="en-US" dirty="0">
                 <a:cs typeface="Courier New" panose="02070309020205020404" pitchFamily="49" charset="0"/>
               </a:rPr>
-              <a:t>We covered </a:t>
+              <a:t>We cover </a:t>
             </a:r>
             <a:r>
               <a:rPr lang="en-US" dirty="0" err="1">
@@ -32160,7 +32244,7 @@
               <a:rPr lang="en-US" dirty="0">
                 <a:cs typeface="Courier New" panose="02070309020205020404" pitchFamily="49" charset="0"/>
               </a:rPr>
-              <a:t>, bash some and python a bit</a:t>
+              <a:t>, some bash and a bit of python</a:t>
             </a:r>
           </a:p>
           <a:p>
@@ -32199,6 +32283,11 @@
               </a:rPr>
               <a:t>We cover C in this section</a:t>
             </a:r>
+          </a:p>
+          <a:p>
+            <a:endParaRPr lang="en-US">
+              <a:cs typeface="Courier New" panose="02070309020205020404" pitchFamily="49" charset="0"/>
+            </a:endParaRPr>
           </a:p>
           <a:p>
             <a:r>
@@ -33314,6 +33403,11 @@
             <a:off x="1535296" y="1369219"/>
             <a:ext cx="7012022" cy="3263504"/>
           </a:xfrm>
+          <a:ln>
+            <a:solidFill>
+              <a:schemeClr val="tx1"/>
+            </a:solidFill>
+          </a:ln>
         </p:spPr>
         <p:txBody>
           <a:bodyPr/>
@@ -33554,19 +33648,16 @@
               <a:t> -c </a:t>
             </a:r>
             <a:r>
-              <a:rPr lang="en-US" b="1">
-                <a:latin typeface="Courier New" panose="02070309020205020404" pitchFamily="49" charset="0"/>
-                <a:cs typeface="Courier New" panose="02070309020205020404" pitchFamily="49" charset="0"/>
-              </a:rPr>
-              <a:t>main.</a:t>
-            </a:r>
-            <a:r>
-              <a:rPr lang="en-US" b="1" dirty="0">
-                <a:latin typeface="Courier New" panose="02070309020205020404" pitchFamily="49" charset="0"/>
-                <a:cs typeface="Courier New" panose="02070309020205020404" pitchFamily="49" charset="0"/>
-              </a:rPr>
-              <a:t>c</a:t>
-            </a:r>
+              <a:rPr lang="en-US" b="1" dirty="0" err="1">
+                <a:latin typeface="Courier New" panose="02070309020205020404" pitchFamily="49" charset="0"/>
+                <a:cs typeface="Courier New" panose="02070309020205020404" pitchFamily="49" charset="0"/>
+              </a:rPr>
+              <a:t>main.c</a:t>
+            </a:r>
+            <a:endParaRPr lang="en-US" b="1" dirty="0">
+              <a:latin typeface="Courier New" panose="02070309020205020404" pitchFamily="49" charset="0"/>
+              <a:cs typeface="Courier New" panose="02070309020205020404" pitchFamily="49" charset="0"/>
+            </a:endParaRPr>
           </a:p>
         </p:txBody>
       </p:sp>
@@ -34206,7 +34297,7 @@
         </p:nvSpPr>
         <p:spPr>
           <a:xfrm>
-            <a:off x="1321675" y="3835136"/>
+            <a:off x="1461157" y="3835136"/>
             <a:ext cx="1182375" cy="307777"/>
           </a:xfrm>
           <a:prstGeom prst="rect">
@@ -34422,7 +34513,7 @@
               <a:t>#create dep2.o</a:t>
             </a:r>
             <a:br>
-              <a:rPr lang="en-US" b="1" dirty="0">
+              <a:rPr lang="en-US" dirty="0">
                 <a:latin typeface="Courier New" panose="02070309020205020404" pitchFamily="49" charset="0"/>
                 <a:cs typeface="Courier New" panose="02070309020205020404" pitchFamily="49" charset="0"/>
               </a:rPr>
@@ -34439,14 +34530,28 @@
                 <a:latin typeface="Courier New" panose="02070309020205020404" pitchFamily="49" charset="0"/>
                 <a:cs typeface="Courier New" panose="02070309020205020404" pitchFamily="49" charset="0"/>
               </a:rPr>
-              <a:t> -c dep3.c </a:t>
+              <a:t> -c </a:t>
+            </a:r>
+            <a:r>
+              <a:rPr lang="en-US" b="1" dirty="0" err="1">
+                <a:latin typeface="Courier New" panose="02070309020205020404" pitchFamily="49" charset="0"/>
+                <a:cs typeface="Courier New" panose="02070309020205020404" pitchFamily="49" charset="0"/>
+              </a:rPr>
+              <a:t>main.c</a:t>
             </a:r>
             <a:r>
               <a:rPr lang="en-US" dirty="0">
                 <a:latin typeface="Courier New" panose="02070309020205020404" pitchFamily="49" charset="0"/>
                 <a:cs typeface="Courier New" panose="02070309020205020404" pitchFamily="49" charset="0"/>
               </a:rPr>
-              <a:t>#create dep3.o</a:t>
+              <a:t> #create </a:t>
+            </a:r>
+            <a:r>
+              <a:rPr lang="en-US" dirty="0" err="1">
+                <a:latin typeface="Courier New" panose="02070309020205020404" pitchFamily="49" charset="0"/>
+                <a:cs typeface="Courier New" panose="02070309020205020404" pitchFamily="49" charset="0"/>
+              </a:rPr>
+              <a:t>main.o</a:t>
             </a:r>
             <a:br>
               <a:rPr lang="en-US" b="1" dirty="0">
@@ -34483,7 +34588,21 @@
                 <a:latin typeface="Courier New" panose="02070309020205020404" pitchFamily="49" charset="0"/>
                 <a:cs typeface="Courier New" panose="02070309020205020404" pitchFamily="49" charset="0"/>
               </a:rPr>
-              <a:t> dep1.o dep2.o dep3.o -</a:t>
+              <a:t> </a:t>
+            </a:r>
+            <a:r>
+              <a:rPr lang="en-US" b="1" dirty="0" err="1">
+                <a:latin typeface="Courier New" panose="02070309020205020404" pitchFamily="49" charset="0"/>
+                <a:cs typeface="Courier New" panose="02070309020205020404" pitchFamily="49" charset="0"/>
+              </a:rPr>
+              <a:t>main.o</a:t>
+            </a:r>
+            <a:r>
+              <a:rPr lang="en-US" b="1" dirty="0">
+                <a:latin typeface="Courier New" panose="02070309020205020404" pitchFamily="49" charset="0"/>
+                <a:cs typeface="Courier New" panose="02070309020205020404" pitchFamily="49" charset="0"/>
+              </a:rPr>
+              <a:t> dep1.o dep2.o -</a:t>
             </a:r>
             <a:r>
               <a:rPr lang="en-US" b="1" dirty="0" err="1">

</xml_diff>

<commit_message>
add line about c_examples.tgz
</commit_message>
<xml_diff>
--- a/lpt_LISA.pptx
+++ b/lpt_LISA.pptx
@@ -22946,9 +22946,6 @@
               </a:rPr>
               <a:t>https://github.com/ketancmaheshwari/lisa19</a:t>
             </a:r>
-            <a:endParaRPr lang="en-US" sz="3200" dirty="0"/>
-          </a:p>
-          <a:p>
             <a:endParaRPr lang="en-US" dirty="0"/>
           </a:p>
           <a:p>
@@ -22959,7 +22956,9 @@
             <a:endParaRPr lang="en-US" dirty="0"/>
           </a:p>
           <a:p>
-            <a:pPr lvl="1"/>
+            <a:pPr marL="342900" lvl="1" indent="0">
+              <a:buNone/>
+            </a:pPr>
             <a:r>
               <a:rPr lang="en-US" dirty="0"/>
               <a:t>Tabular data with five columns</a:t>
@@ -22973,11 +22972,38 @@
             <a:endParaRPr lang="en-US" dirty="0"/>
           </a:p>
           <a:p>
-            <a:pPr lvl="1"/>
+            <a:pPr marL="342900" lvl="1" indent="0">
+              <a:buNone/>
+            </a:pPr>
             <a:r>
               <a:rPr lang="en-US" dirty="0"/>
               <a:t>Prose with sentences and paragraphs</a:t>
             </a:r>
+          </a:p>
+          <a:p>
+            <a:r>
+              <a:rPr lang="en-US" dirty="0" err="1"/>
+              <a:t>c_example.tgz</a:t>
+            </a:r>
+            <a:endParaRPr lang="en-US" dirty="0"/>
+          </a:p>
+          <a:p>
+            <a:pPr marL="342900" lvl="1" indent="0">
+              <a:buNone/>
+            </a:pPr>
+            <a:r>
+              <a:rPr lang="en-US" dirty="0"/>
+              <a:t>Code and </a:t>
+            </a:r>
+            <a:r>
+              <a:rPr lang="en-US" dirty="0" err="1"/>
+              <a:t>Makefile</a:t>
+            </a:r>
+            <a:r>
+              <a:rPr lang="en-US"/>
+              <a:t> example files</a:t>
+            </a:r>
+            <a:endParaRPr lang="en-US" dirty="0"/>
           </a:p>
         </p:txBody>
       </p:sp>

</xml_diff>

<commit_message>
updated links and added about pandoc
</commit_message>
<xml_diff>
--- a/lpt_LISA.pptx
+++ b/lpt_LISA.pptx
@@ -314,7 +314,7 @@
           <a:p>
             <a:fld id="{DE0C789A-1381-F54D-B55B-DCBB91319C08}" type="datetimeFigureOut">
               <a:rPr lang="en-US" smtClean="0"/>
-              <a:t>7/2/20</a:t>
+              <a:t>7/7/20</a:t>
             </a:fld>
             <a:endParaRPr lang="en-US"/>
           </a:p>
@@ -491,7 +491,7 @@
           <a:p>
             <a:fld id="{46CB9FDB-056B-6244-AE56-9549F1074EBB}" type="datetimeFigureOut">
               <a:rPr lang="en-US" smtClean="0"/>
-              <a:t>7/2/20</a:t>
+              <a:t>7/7/20</a:t>
             </a:fld>
             <a:endParaRPr lang="en-US"/>
           </a:p>
@@ -2055,7 +2055,7 @@
           <a:p>
             <a:fld id="{524F091B-C9FE-714F-8F5F-8CFB82A747F1}" type="datetime1">
               <a:rPr lang="en-US" smtClean="0"/>
-              <a:t>7/2/20</a:t>
+              <a:t>7/7/20</a:t>
             </a:fld>
             <a:endParaRPr lang="en-US"/>
           </a:p>
@@ -2225,7 +2225,7 @@
           <a:p>
             <a:fld id="{E5121F4C-BC13-F84F-9AD9-260A611D728C}" type="datetime1">
               <a:rPr lang="en-US" smtClean="0"/>
-              <a:t>7/2/20</a:t>
+              <a:t>7/7/20</a:t>
             </a:fld>
             <a:endParaRPr lang="en-US"/>
           </a:p>
@@ -2405,7 +2405,7 @@
           <a:p>
             <a:fld id="{69934431-5E8A-0144-AD3C-F9F3B5843812}" type="datetime1">
               <a:rPr lang="en-US" smtClean="0"/>
-              <a:t>7/2/20</a:t>
+              <a:t>7/7/20</a:t>
             </a:fld>
             <a:endParaRPr lang="en-US"/>
           </a:p>
@@ -2575,7 +2575,7 @@
           <a:p>
             <a:fld id="{4D966F88-1DAF-F94F-A3D2-93E7964825AC}" type="datetime1">
               <a:rPr lang="en-US" smtClean="0"/>
-              <a:t>7/2/20</a:t>
+              <a:t>7/7/20</a:t>
             </a:fld>
             <a:endParaRPr lang="en-US"/>
           </a:p>
@@ -2821,7 +2821,7 @@
           <a:p>
             <a:fld id="{75F67F5F-B354-5B41-A0FF-E33ACFB7B000}" type="datetime1">
               <a:rPr lang="en-US" smtClean="0"/>
-              <a:t>7/2/20</a:t>
+              <a:t>7/7/20</a:t>
             </a:fld>
             <a:endParaRPr lang="en-US"/>
           </a:p>
@@ -3053,7 +3053,7 @@
           <a:p>
             <a:fld id="{1FE71E3D-61C4-AF47-B5F6-80F7A2125094}" type="datetime1">
               <a:rPr lang="en-US" smtClean="0"/>
-              <a:t>7/2/20</a:t>
+              <a:t>7/7/20</a:t>
             </a:fld>
             <a:endParaRPr lang="en-US"/>
           </a:p>
@@ -3420,7 +3420,7 @@
           <a:p>
             <a:fld id="{B7259F95-3E7B-AE48-BD5A-55F4F48F15EE}" type="datetime1">
               <a:rPr lang="en-US" smtClean="0"/>
-              <a:t>7/2/20</a:t>
+              <a:t>7/7/20</a:t>
             </a:fld>
             <a:endParaRPr lang="en-US"/>
           </a:p>
@@ -3538,7 +3538,7 @@
           <a:p>
             <a:fld id="{1E2D71D9-286E-D847-8194-60F3E909E40C}" type="datetime1">
               <a:rPr lang="en-US" smtClean="0"/>
-              <a:t>7/2/20</a:t>
+              <a:t>7/7/20</a:t>
             </a:fld>
             <a:endParaRPr lang="en-US"/>
           </a:p>
@@ -3633,7 +3633,7 @@
           <a:p>
             <a:fld id="{3AC70D76-DA63-C342-B98E-F532027F9CD7}" type="datetime1">
               <a:rPr lang="en-US" smtClean="0"/>
-              <a:t>7/2/20</a:t>
+              <a:t>7/7/20</a:t>
             </a:fld>
             <a:endParaRPr lang="en-US"/>
           </a:p>
@@ -3910,7 +3910,7 @@
           <a:p>
             <a:fld id="{74E169E1-67F4-DE43-8AD1-CF716A32D6D9}" type="datetime1">
               <a:rPr lang="en-US" smtClean="0"/>
-              <a:t>7/2/20</a:t>
+              <a:t>7/7/20</a:t>
             </a:fld>
             <a:endParaRPr lang="en-US"/>
           </a:p>
@@ -4167,7 +4167,7 @@
           <a:p>
             <a:fld id="{EDBC0E13-B072-744E-A1EF-1258C23FD22F}" type="datetime1">
               <a:rPr lang="en-US" smtClean="0"/>
-              <a:t>7/2/20</a:t>
+              <a:t>7/7/20</a:t>
             </a:fld>
             <a:endParaRPr lang="en-US"/>
           </a:p>
@@ -4380,7 +4380,7 @@
           <a:p>
             <a:fld id="{14D54490-4A22-8B41-9AA4-9BECA28CBC89}" type="datetime1">
               <a:rPr lang="en-US" smtClean="0"/>
-              <a:t>7/2/20</a:t>
+              <a:t>7/7/20</a:t>
             </a:fld>
             <a:endParaRPr lang="en-US"/>
           </a:p>
@@ -37973,6 +37973,236 @@
           <a:lstStyle/>
           <a:p>
             <a:r>
+              <a:rPr lang="en-US" dirty="0" err="1">
+                <a:cs typeface="Courier New" panose="02070309020205020404" pitchFamily="49" charset="0"/>
+              </a:rPr>
+              <a:t>pandoc</a:t>
+            </a:r>
+            <a:r>
+              <a:rPr lang="en-US" dirty="0"/>
+              <a:t> to convert between </a:t>
+            </a:r>
+            <a:r>
+              <a:rPr lang="en-US" dirty="0">
+                <a:cs typeface="Courier New" panose="02070309020205020404" pitchFamily="49" charset="0"/>
+              </a:rPr>
+              <a:t>md</a:t>
+            </a:r>
+            <a:r>
+              <a:rPr lang="en-US" dirty="0"/>
+              <a:t>, </a:t>
+            </a:r>
+            <a:r>
+              <a:rPr lang="en-US" dirty="0" err="1">
+                <a:cs typeface="Courier New" panose="02070309020205020404" pitchFamily="49" charset="0"/>
+              </a:rPr>
+              <a:t>tex</a:t>
+            </a:r>
+            <a:r>
+              <a:rPr lang="en-US" dirty="0"/>
+              <a:t>, </a:t>
+            </a:r>
+            <a:r>
+              <a:rPr lang="en-US" dirty="0">
+                <a:cs typeface="Courier New" panose="02070309020205020404" pitchFamily="49" charset="0"/>
+              </a:rPr>
+              <a:t>txt</a:t>
+            </a:r>
+            <a:r>
+              <a:rPr lang="en-US" dirty="0"/>
+              <a:t>, </a:t>
+            </a:r>
+            <a:r>
+              <a:rPr lang="en-US" dirty="0">
+                <a:cs typeface="Courier New" panose="02070309020205020404" pitchFamily="49" charset="0"/>
+              </a:rPr>
+              <a:t>html</a:t>
+            </a:r>
+            <a:r>
+              <a:rPr lang="en-US" dirty="0"/>
+              <a:t>, </a:t>
+            </a:r>
+            <a:r>
+              <a:rPr lang="en-US" dirty="0">
+                <a:cs typeface="Courier New" panose="02070309020205020404" pitchFamily="49" charset="0"/>
+              </a:rPr>
+              <a:t>docx</a:t>
+            </a:r>
+            <a:r>
+              <a:rPr lang="en-US" dirty="0"/>
+              <a:t>, </a:t>
+            </a:r>
+            <a:r>
+              <a:rPr lang="en-US" dirty="0">
+                <a:cs typeface="Courier New" panose="02070309020205020404" pitchFamily="49" charset="0"/>
+              </a:rPr>
+              <a:t>pdf</a:t>
+            </a:r>
+            <a:r>
+              <a:rPr lang="en-US" dirty="0"/>
+              <a:t>, </a:t>
+            </a:r>
+            <a:r>
+              <a:rPr lang="en-US" dirty="0" err="1">
+                <a:cs typeface="Courier New" panose="02070309020205020404" pitchFamily="49" charset="0"/>
+              </a:rPr>
+              <a:t>odt</a:t>
+            </a:r>
+            <a:br>
+              <a:rPr lang="en-US" b="1" dirty="0">
+                <a:latin typeface="Courier New" panose="02070309020205020404" pitchFamily="49" charset="0"/>
+                <a:cs typeface="Courier New" panose="02070309020205020404" pitchFamily="49" charset="0"/>
+              </a:rPr>
+            </a:br>
+            <a:r>
+              <a:rPr lang="en-US" b="1" dirty="0" err="1">
+                <a:latin typeface="Courier New" panose="02070309020205020404" pitchFamily="49" charset="0"/>
+                <a:cs typeface="Courier New" panose="02070309020205020404" pitchFamily="49" charset="0"/>
+              </a:rPr>
+              <a:t>pandoc</a:t>
+            </a:r>
+            <a:r>
+              <a:rPr lang="en-US" b="1" dirty="0">
+                <a:latin typeface="Courier New" panose="02070309020205020404" pitchFamily="49" charset="0"/>
+                <a:cs typeface="Courier New" panose="02070309020205020404" pitchFamily="49" charset="0"/>
+              </a:rPr>
+              <a:t> </a:t>
+            </a:r>
+            <a:r>
+              <a:rPr lang="en-US" b="1" dirty="0" err="1">
+                <a:latin typeface="Courier New" panose="02070309020205020404" pitchFamily="49" charset="0"/>
+                <a:cs typeface="Courier New" panose="02070309020205020404" pitchFamily="49" charset="0"/>
+              </a:rPr>
+              <a:t>manual.md</a:t>
+            </a:r>
+            <a:r>
+              <a:rPr lang="en-US" b="1" dirty="0">
+                <a:latin typeface="Courier New" panose="02070309020205020404" pitchFamily="49" charset="0"/>
+                <a:cs typeface="Courier New" panose="02070309020205020404" pitchFamily="49" charset="0"/>
+              </a:rPr>
+              <a:t> -o </a:t>
+            </a:r>
+            <a:r>
+              <a:rPr lang="en-US" b="1" dirty="0" err="1">
+                <a:latin typeface="Courier New" panose="02070309020205020404" pitchFamily="49" charset="0"/>
+                <a:cs typeface="Courier New" panose="02070309020205020404" pitchFamily="49" charset="0"/>
+              </a:rPr>
+              <a:t>manual.pdf</a:t>
+            </a:r>
+            <a:br>
+              <a:rPr lang="en-US" b="1" dirty="0">
+                <a:latin typeface="Courier New" panose="02070309020205020404" pitchFamily="49" charset="0"/>
+                <a:cs typeface="Courier New" panose="02070309020205020404" pitchFamily="49" charset="0"/>
+              </a:rPr>
+            </a:br>
+            <a:r>
+              <a:rPr lang="en-US" b="1" dirty="0" err="1">
+                <a:latin typeface="Courier New" panose="02070309020205020404" pitchFamily="49" charset="0"/>
+                <a:cs typeface="Courier New" panose="02070309020205020404" pitchFamily="49" charset="0"/>
+              </a:rPr>
+              <a:t>pandoc</a:t>
+            </a:r>
+            <a:r>
+              <a:rPr lang="en-US" b="1" dirty="0">
+                <a:latin typeface="Courier New" panose="02070309020205020404" pitchFamily="49" charset="0"/>
+                <a:cs typeface="Courier New" panose="02070309020205020404" pitchFamily="49" charset="0"/>
+              </a:rPr>
+              <a:t> </a:t>
+            </a:r>
+            <a:r>
+              <a:rPr lang="en-US" b="1" dirty="0" err="1">
+                <a:latin typeface="Courier New" panose="02070309020205020404" pitchFamily="49" charset="0"/>
+                <a:cs typeface="Courier New" panose="02070309020205020404" pitchFamily="49" charset="0"/>
+              </a:rPr>
+              <a:t>example.txt</a:t>
+            </a:r>
+            <a:r>
+              <a:rPr lang="en-US" b="1" dirty="0">
+                <a:latin typeface="Courier New" panose="02070309020205020404" pitchFamily="49" charset="0"/>
+                <a:cs typeface="Courier New" panose="02070309020205020404" pitchFamily="49" charset="0"/>
+              </a:rPr>
+              <a:t> -o </a:t>
+            </a:r>
+            <a:r>
+              <a:rPr lang="en-US" b="1" dirty="0" err="1">
+                <a:latin typeface="Courier New" panose="02070309020205020404" pitchFamily="49" charset="0"/>
+                <a:cs typeface="Courier New" panose="02070309020205020404" pitchFamily="49" charset="0"/>
+              </a:rPr>
+              <a:t>example.html</a:t>
+            </a:r>
+            <a:br>
+              <a:rPr lang="en-US" b="1" dirty="0">
+                <a:latin typeface="Courier New" panose="02070309020205020404" pitchFamily="49" charset="0"/>
+                <a:cs typeface="Courier New" panose="02070309020205020404" pitchFamily="49" charset="0"/>
+              </a:rPr>
+            </a:br>
+            <a:r>
+              <a:rPr lang="en-US" b="1" dirty="0" err="1">
+                <a:latin typeface="Courier New" panose="02070309020205020404" pitchFamily="49" charset="0"/>
+                <a:cs typeface="Courier New" panose="02070309020205020404" pitchFamily="49" charset="0"/>
+              </a:rPr>
+              <a:t>pandoc</a:t>
+            </a:r>
+            <a:r>
+              <a:rPr lang="en-US" b="1" dirty="0">
+                <a:latin typeface="Courier New" panose="02070309020205020404" pitchFamily="49" charset="0"/>
+                <a:cs typeface="Courier New" panose="02070309020205020404" pitchFamily="49" charset="0"/>
+              </a:rPr>
+              <a:t> -s </a:t>
+            </a:r>
+            <a:r>
+              <a:rPr lang="en-US" b="1" dirty="0" err="1">
+                <a:latin typeface="Courier New" panose="02070309020205020404" pitchFamily="49" charset="0"/>
+                <a:cs typeface="Courier New" panose="02070309020205020404" pitchFamily="49" charset="0"/>
+              </a:rPr>
+              <a:t>example.txt</a:t>
+            </a:r>
+            <a:r>
+              <a:rPr lang="en-US" b="1" dirty="0">
+                <a:latin typeface="Courier New" panose="02070309020205020404" pitchFamily="49" charset="0"/>
+                <a:cs typeface="Courier New" panose="02070309020205020404" pitchFamily="49" charset="0"/>
+              </a:rPr>
+              <a:t> -o </a:t>
+            </a:r>
+            <a:r>
+              <a:rPr lang="en-US" b="1" dirty="0" err="1">
+                <a:latin typeface="Courier New" panose="02070309020205020404" pitchFamily="49" charset="0"/>
+                <a:cs typeface="Courier New" panose="02070309020205020404" pitchFamily="49" charset="0"/>
+              </a:rPr>
+              <a:t>example.docx</a:t>
+            </a:r>
+            <a:endParaRPr lang="en-US" b="1" dirty="0">
+              <a:latin typeface="Courier New" panose="02070309020205020404" pitchFamily="49" charset="0"/>
+              <a:cs typeface="Courier New" panose="02070309020205020404" pitchFamily="49" charset="0"/>
+            </a:endParaRPr>
+          </a:p>
+          <a:p>
+            <a:r>
+              <a:rPr lang="en-US" dirty="0"/>
+              <a:t>Parse and read </a:t>
+            </a:r>
+            <a:r>
+              <a:rPr lang="en-US" b="1" dirty="0"/>
+              <a:t>xml</a:t>
+            </a:r>
+            <a:r>
+              <a:rPr lang="en-US" dirty="0"/>
+              <a:t> files with </a:t>
+            </a:r>
+            <a:r>
+              <a:rPr lang="en-US" b="1" dirty="0" err="1">
+                <a:latin typeface="Courier New" panose="02070309020205020404" pitchFamily="49" charset="0"/>
+                <a:cs typeface="Courier New" panose="02070309020205020404" pitchFamily="49" charset="0"/>
+              </a:rPr>
+              <a:t>xmllint</a:t>
+            </a:r>
+            <a:endParaRPr lang="en-US" b="1" dirty="0">
+              <a:latin typeface="Courier New" panose="02070309020205020404" pitchFamily="49" charset="0"/>
+              <a:cs typeface="Courier New" panose="02070309020205020404" pitchFamily="49" charset="0"/>
+            </a:endParaRPr>
+          </a:p>
+          <a:p>
+            <a:r>
               <a:rPr lang="en-US" dirty="0"/>
               <a:t>Split a large file into small chunks (</a:t>
             </a:r>
@@ -38650,7 +38880,7 @@
               <a:rPr lang="en-US" dirty="0">
                 <a:hlinkClick r:id="rId4"/>
               </a:rPr>
-              <a:t>linux.byexamples.com/archives/42/command-line-calculator-bc</a:t>
+              <a:t>linux.byexamples.com</a:t>
             </a:r>
             <a:endParaRPr lang="en-US" dirty="0"/>
           </a:p>
@@ -38676,12 +38906,12 @@
               <a:rPr lang="en-US" dirty="0">
                 <a:hlinkClick r:id="rId6"/>
               </a:rPr>
-              <a:t>https://gist.github.com/MohamedAlaa/2961058#file-tmux-cheatsheet-markdown</a:t>
-            </a:r>
-          </a:p>
-          <a:p>
-            <a:r>
-              <a:rPr lang="en-US" dirty="0" err="1">
+              <a:t>gist.github.com/MohamedAlaa/2961058#file-tmux-cheatsheet-markdown</a:t>
+            </a:r>
+          </a:p>
+          <a:p>
+            <a:r>
+              <a:rPr lang="en-US" dirty="0">
                 <a:hlinkClick r:id="rId6"/>
               </a:rPr>
               <a:t>wizardzines.com</a:t>
@@ -38693,12 +38923,6 @@
               <a:rPr lang="en-US" dirty="0">
                 <a:hlinkClick r:id="rId7"/>
               </a:rPr>
-              <a:t>https://</a:t>
-            </a:r>
-            <a:r>
-              <a:rPr lang="en-US" dirty="0" err="1">
-                <a:hlinkClick r:id="rId7"/>
-              </a:rPr>
               <a:t>crontab.guru</a:t>
             </a:r>
             <a:endParaRPr lang="en-US" dirty="0"/>
@@ -38726,19 +38950,7 @@
               <a:rPr lang="en-US" dirty="0">
                 <a:hlinkClick r:id="rId10"/>
               </a:rPr>
-              <a:t>danyspin97.org/blog/</a:t>
-            </a:r>
-            <a:r>
-              <a:rPr lang="en-US" dirty="0" err="1">
-                <a:hlinkClick r:id="rId10"/>
-              </a:rPr>
-              <a:t>makefiles</a:t>
-            </a:r>
-            <a:r>
-              <a:rPr lang="en-US" dirty="0">
-                <a:hlinkClick r:id="rId10"/>
-              </a:rPr>
-              <a:t>-best-practices</a:t>
+              <a:t>danyspin97.org/blog/makefiles-best-practices</a:t>
             </a:r>
             <a:endParaRPr lang="en-US" dirty="0"/>
           </a:p>

</xml_diff>

<commit_message>
add man man and a minor fix
</commit_message>
<xml_diff>
--- a/lpt_LISA.pptx
+++ b/lpt_LISA.pptx
@@ -314,7 +314,7 @@
           <a:p>
             <a:fld id="{DE0C789A-1381-F54D-B55B-DCBB91319C08}" type="datetimeFigureOut">
               <a:rPr lang="en-US" smtClean="0"/>
-              <a:t>9/22/20</a:t>
+              <a:t>10/17/20</a:t>
             </a:fld>
             <a:endParaRPr lang="en-US"/>
           </a:p>
@@ -491,7 +491,7 @@
           <a:p>
             <a:fld id="{46CB9FDB-056B-6244-AE56-9549F1074EBB}" type="datetimeFigureOut">
               <a:rPr lang="en-US" smtClean="0"/>
-              <a:t>9/22/20</a:t>
+              <a:t>10/17/20</a:t>
             </a:fld>
             <a:endParaRPr lang="en-US"/>
           </a:p>
@@ -2055,7 +2055,7 @@
           <a:p>
             <a:fld id="{524F091B-C9FE-714F-8F5F-8CFB82A747F1}" type="datetime1">
               <a:rPr lang="en-US" smtClean="0"/>
-              <a:t>9/22/20</a:t>
+              <a:t>10/17/20</a:t>
             </a:fld>
             <a:endParaRPr lang="en-US"/>
           </a:p>
@@ -2225,7 +2225,7 @@
           <a:p>
             <a:fld id="{E5121F4C-BC13-F84F-9AD9-260A611D728C}" type="datetime1">
               <a:rPr lang="en-US" smtClean="0"/>
-              <a:t>9/22/20</a:t>
+              <a:t>10/17/20</a:t>
             </a:fld>
             <a:endParaRPr lang="en-US"/>
           </a:p>
@@ -2405,7 +2405,7 @@
           <a:p>
             <a:fld id="{69934431-5E8A-0144-AD3C-F9F3B5843812}" type="datetime1">
               <a:rPr lang="en-US" smtClean="0"/>
-              <a:t>9/22/20</a:t>
+              <a:t>10/17/20</a:t>
             </a:fld>
             <a:endParaRPr lang="en-US"/>
           </a:p>
@@ -2575,7 +2575,7 @@
           <a:p>
             <a:fld id="{4D966F88-1DAF-F94F-A3D2-93E7964825AC}" type="datetime1">
               <a:rPr lang="en-US" smtClean="0"/>
-              <a:t>9/22/20</a:t>
+              <a:t>10/17/20</a:t>
             </a:fld>
             <a:endParaRPr lang="en-US"/>
           </a:p>
@@ -2821,7 +2821,7 @@
           <a:p>
             <a:fld id="{75F67F5F-B354-5B41-A0FF-E33ACFB7B000}" type="datetime1">
               <a:rPr lang="en-US" smtClean="0"/>
-              <a:t>9/22/20</a:t>
+              <a:t>10/17/20</a:t>
             </a:fld>
             <a:endParaRPr lang="en-US"/>
           </a:p>
@@ -3053,7 +3053,7 @@
           <a:p>
             <a:fld id="{1FE71E3D-61C4-AF47-B5F6-80F7A2125094}" type="datetime1">
               <a:rPr lang="en-US" smtClean="0"/>
-              <a:t>9/22/20</a:t>
+              <a:t>10/17/20</a:t>
             </a:fld>
             <a:endParaRPr lang="en-US"/>
           </a:p>
@@ -3420,7 +3420,7 @@
           <a:p>
             <a:fld id="{B7259F95-3E7B-AE48-BD5A-55F4F48F15EE}" type="datetime1">
               <a:rPr lang="en-US" smtClean="0"/>
-              <a:t>9/22/20</a:t>
+              <a:t>10/17/20</a:t>
             </a:fld>
             <a:endParaRPr lang="en-US"/>
           </a:p>
@@ -3538,7 +3538,7 @@
           <a:p>
             <a:fld id="{1E2D71D9-286E-D847-8194-60F3E909E40C}" type="datetime1">
               <a:rPr lang="en-US" smtClean="0"/>
-              <a:t>9/22/20</a:t>
+              <a:t>10/17/20</a:t>
             </a:fld>
             <a:endParaRPr lang="en-US"/>
           </a:p>
@@ -3633,7 +3633,7 @@
           <a:p>
             <a:fld id="{3AC70D76-DA63-C342-B98E-F532027F9CD7}" type="datetime1">
               <a:rPr lang="en-US" smtClean="0"/>
-              <a:t>9/22/20</a:t>
+              <a:t>10/17/20</a:t>
             </a:fld>
             <a:endParaRPr lang="en-US"/>
           </a:p>
@@ -3910,7 +3910,7 @@
           <a:p>
             <a:fld id="{74E169E1-67F4-DE43-8AD1-CF716A32D6D9}" type="datetime1">
               <a:rPr lang="en-US" smtClean="0"/>
-              <a:t>9/22/20</a:t>
+              <a:t>10/17/20</a:t>
             </a:fld>
             <a:endParaRPr lang="en-US"/>
           </a:p>
@@ -4167,7 +4167,7 @@
           <a:p>
             <a:fld id="{EDBC0E13-B072-744E-A1EF-1258C23FD22F}" type="datetime1">
               <a:rPr lang="en-US" smtClean="0"/>
-              <a:t>9/22/20</a:t>
+              <a:t>10/17/20</a:t>
             </a:fld>
             <a:endParaRPr lang="en-US"/>
           </a:p>
@@ -4380,7 +4380,7 @@
           <a:p>
             <a:fld id="{14D54490-4A22-8B41-9AA4-9BECA28CBC89}" type="datetime1">
               <a:rPr lang="en-US" smtClean="0"/>
-              <a:t>9/22/20</a:t>
+              <a:t>10/17/20</a:t>
             </a:fld>
             <a:endParaRPr lang="en-US"/>
           </a:p>
@@ -5420,7 +5420,7 @@
                 <a:ea typeface="Courier New" charset="0"/>
                 <a:cs typeface="Courier New" charset="0"/>
               </a:rPr>
-              <a:t>to kill zombie processes</a:t>
+              <a:t>to kill non-responsive processes</a:t>
             </a:r>
           </a:p>
           <a:p>
@@ -6776,7 +6776,18 @@
             <a:pPr lvl="1"/>
             <a:r>
               <a:rPr lang="en-US" dirty="0"/>
-              <a:t>Manual pages organized section-wise</a:t>
+              <a:t>Manual pages organized section-wise (see </a:t>
+            </a:r>
+            <a:r>
+              <a:rPr lang="en-US" b="1" dirty="0">
+                <a:latin typeface="Courier New" panose="02070309020205020404" pitchFamily="49" charset="0"/>
+                <a:cs typeface="Courier New" panose="02070309020205020404" pitchFamily="49" charset="0"/>
+              </a:rPr>
+              <a:t>man man</a:t>
+            </a:r>
+            <a:r>
+              <a:rPr lang="en-US" dirty="0"/>
+              <a:t> for more on sections)</a:t>
             </a:r>
           </a:p>
           <a:p>

</xml_diff>

<commit_message>
added examples on streams and a minor change
</commit_message>
<xml_diff>
--- a/lpt_LISA.pptx
+++ b/lpt_LISA.pptx
@@ -314,7 +314,7 @@
           <a:p>
             <a:fld id="{DE0C789A-1381-F54D-B55B-DCBB91319C08}" type="datetimeFigureOut">
               <a:rPr lang="en-US" smtClean="0"/>
-              <a:t>4/9/21</a:t>
+              <a:t>5/18/21</a:t>
             </a:fld>
             <a:endParaRPr lang="en-US"/>
           </a:p>
@@ -491,7 +491,7 @@
           <a:p>
             <a:fld id="{46CB9FDB-056B-6244-AE56-9549F1074EBB}" type="datetimeFigureOut">
               <a:rPr lang="en-US" smtClean="0"/>
-              <a:t>4/9/21</a:t>
+              <a:t>5/18/21</a:t>
             </a:fld>
             <a:endParaRPr lang="en-US"/>
           </a:p>
@@ -2055,7 +2055,7 @@
           <a:p>
             <a:fld id="{524F091B-C9FE-714F-8F5F-8CFB82A747F1}" type="datetime1">
               <a:rPr lang="en-US" smtClean="0"/>
-              <a:t>4/9/21</a:t>
+              <a:t>5/18/21</a:t>
             </a:fld>
             <a:endParaRPr lang="en-US"/>
           </a:p>
@@ -2225,7 +2225,7 @@
           <a:p>
             <a:fld id="{E5121F4C-BC13-F84F-9AD9-260A611D728C}" type="datetime1">
               <a:rPr lang="en-US" smtClean="0"/>
-              <a:t>4/9/21</a:t>
+              <a:t>5/18/21</a:t>
             </a:fld>
             <a:endParaRPr lang="en-US"/>
           </a:p>
@@ -2405,7 +2405,7 @@
           <a:p>
             <a:fld id="{69934431-5E8A-0144-AD3C-F9F3B5843812}" type="datetime1">
               <a:rPr lang="en-US" smtClean="0"/>
-              <a:t>4/9/21</a:t>
+              <a:t>5/18/21</a:t>
             </a:fld>
             <a:endParaRPr lang="en-US"/>
           </a:p>
@@ -2575,7 +2575,7 @@
           <a:p>
             <a:fld id="{4D966F88-1DAF-F94F-A3D2-93E7964825AC}" type="datetime1">
               <a:rPr lang="en-US" smtClean="0"/>
-              <a:t>4/9/21</a:t>
+              <a:t>5/18/21</a:t>
             </a:fld>
             <a:endParaRPr lang="en-US"/>
           </a:p>
@@ -2821,7 +2821,7 @@
           <a:p>
             <a:fld id="{75F67F5F-B354-5B41-A0FF-E33ACFB7B000}" type="datetime1">
               <a:rPr lang="en-US" smtClean="0"/>
-              <a:t>4/9/21</a:t>
+              <a:t>5/18/21</a:t>
             </a:fld>
             <a:endParaRPr lang="en-US"/>
           </a:p>
@@ -3053,7 +3053,7 @@
           <a:p>
             <a:fld id="{1FE71E3D-61C4-AF47-B5F6-80F7A2125094}" type="datetime1">
               <a:rPr lang="en-US" smtClean="0"/>
-              <a:t>4/9/21</a:t>
+              <a:t>5/18/21</a:t>
             </a:fld>
             <a:endParaRPr lang="en-US"/>
           </a:p>
@@ -3420,7 +3420,7 @@
           <a:p>
             <a:fld id="{B7259F95-3E7B-AE48-BD5A-55F4F48F15EE}" type="datetime1">
               <a:rPr lang="en-US" smtClean="0"/>
-              <a:t>4/9/21</a:t>
+              <a:t>5/18/21</a:t>
             </a:fld>
             <a:endParaRPr lang="en-US"/>
           </a:p>
@@ -3538,7 +3538,7 @@
           <a:p>
             <a:fld id="{1E2D71D9-286E-D847-8194-60F3E909E40C}" type="datetime1">
               <a:rPr lang="en-US" smtClean="0"/>
-              <a:t>4/9/21</a:t>
+              <a:t>5/18/21</a:t>
             </a:fld>
             <a:endParaRPr lang="en-US"/>
           </a:p>
@@ -3633,7 +3633,7 @@
           <a:p>
             <a:fld id="{3AC70D76-DA63-C342-B98E-F532027F9CD7}" type="datetime1">
               <a:rPr lang="en-US" smtClean="0"/>
-              <a:t>4/9/21</a:t>
+              <a:t>5/18/21</a:t>
             </a:fld>
             <a:endParaRPr lang="en-US"/>
           </a:p>
@@ -3910,7 +3910,7 @@
           <a:p>
             <a:fld id="{74E169E1-67F4-DE43-8AD1-CF716A32D6D9}" type="datetime1">
               <a:rPr lang="en-US" smtClean="0"/>
-              <a:t>4/9/21</a:t>
+              <a:t>5/18/21</a:t>
             </a:fld>
             <a:endParaRPr lang="en-US"/>
           </a:p>
@@ -4167,7 +4167,7 @@
           <a:p>
             <a:fld id="{EDBC0E13-B072-744E-A1EF-1258C23FD22F}" type="datetime1">
               <a:rPr lang="en-US" smtClean="0"/>
-              <a:t>4/9/21</a:t>
+              <a:t>5/18/21</a:t>
             </a:fld>
             <a:endParaRPr lang="en-US"/>
           </a:p>
@@ -4380,7 +4380,7 @@
           <a:p>
             <a:fld id="{14D54490-4A22-8B41-9AA4-9BECA28CBC89}" type="datetime1">
               <a:rPr lang="en-US" smtClean="0"/>
-              <a:t>4/9/21</a:t>
+              <a:t>5/18/21</a:t>
             </a:fld>
             <a:endParaRPr lang="en-US"/>
           </a:p>
@@ -10592,7 +10592,33 @@
             </a:r>
             <a:r>
               <a:rPr lang="en-US" sz="1800" dirty="0"/>
-              <a:t>  send stream to a file</a:t>
+              <a:t>  send stream to a file (</a:t>
+            </a:r>
+            <a:r>
+              <a:rPr lang="en-US" sz="1800" dirty="0" err="1"/>
+              <a:t>eg.</a:t>
+            </a:r>
+            <a:r>
+              <a:rPr lang="en-US" sz="1800" dirty="0"/>
+              <a:t> </a:t>
+            </a:r>
+            <a:r>
+              <a:rPr lang="en-US" sz="1800" b="1" dirty="0">
+                <a:latin typeface="Courier New" panose="02070309020205020404" pitchFamily="49" charset="0"/>
+                <a:cs typeface="Courier New" panose="02070309020205020404" pitchFamily="49" charset="0"/>
+              </a:rPr>
+              <a:t>ls &gt; </a:t>
+            </a:r>
+            <a:r>
+              <a:rPr lang="en-US" sz="1800" b="1" dirty="0" err="1">
+                <a:latin typeface="Courier New" panose="02070309020205020404" pitchFamily="49" charset="0"/>
+                <a:cs typeface="Courier New" panose="02070309020205020404" pitchFamily="49" charset="0"/>
+              </a:rPr>
+              <a:t>list.txt</a:t>
+            </a:r>
+            <a:r>
+              <a:rPr lang="en-US" sz="1800" dirty="0"/>
+              <a:t>)</a:t>
             </a:r>
           </a:p>
           <a:p>
@@ -10607,13 +10633,41 @@
             </a:r>
             <a:r>
               <a:rPr lang="en-US" sz="1800" dirty="0"/>
-              <a:t>  </a:t>
-            </a:r>
-            <a:r>
-              <a:rPr lang="en-US" sz="1800"/>
-              <a:t>receive stream from a file</a:t>
-            </a:r>
-            <a:endParaRPr lang="en-US" sz="1800" dirty="0"/>
+              <a:t>  receive stream from a file (</a:t>
+            </a:r>
+            <a:r>
+              <a:rPr lang="en-US" sz="1800" dirty="0" err="1"/>
+              <a:t>eg.</a:t>
+            </a:r>
+            <a:r>
+              <a:rPr lang="en-US" sz="1800" dirty="0"/>
+              <a:t> </a:t>
+            </a:r>
+            <a:r>
+              <a:rPr lang="en-US" sz="1800" b="1" dirty="0" err="1">
+                <a:latin typeface="Courier New" panose="02070309020205020404" pitchFamily="49" charset="0"/>
+                <a:cs typeface="Courier New" panose="02070309020205020404" pitchFamily="49" charset="0"/>
+              </a:rPr>
+              <a:t>wc</a:t>
+            </a:r>
+            <a:r>
+              <a:rPr lang="en-US" sz="1800" b="1" dirty="0">
+                <a:latin typeface="Courier New" panose="02070309020205020404" pitchFamily="49" charset="0"/>
+                <a:cs typeface="Courier New" panose="02070309020205020404" pitchFamily="49" charset="0"/>
+              </a:rPr>
+              <a:t> &lt; </a:t>
+            </a:r>
+            <a:r>
+              <a:rPr lang="en-US" sz="1800" b="1" dirty="0" err="1">
+                <a:latin typeface="Courier New" panose="02070309020205020404" pitchFamily="49" charset="0"/>
+                <a:cs typeface="Courier New" panose="02070309020205020404" pitchFamily="49" charset="0"/>
+              </a:rPr>
+              <a:t>list.txt</a:t>
+            </a:r>
+            <a:r>
+              <a:rPr lang="en-US" sz="1800" dirty="0"/>
+              <a:t>)</a:t>
+            </a:r>
           </a:p>
           <a:p>
             <a:pPr lvl="1"/>
@@ -10627,7 +10681,47 @@
             </a:r>
             <a:r>
               <a:rPr lang="en-US" sz="1800" dirty="0"/>
-              <a:t> to append</a:t>
+              <a:t> to append (</a:t>
+            </a:r>
+            <a:r>
+              <a:rPr lang="en-US" sz="1800" dirty="0" err="1"/>
+              <a:t>eg.</a:t>
+            </a:r>
+            <a:r>
+              <a:rPr lang="en-US" sz="1800" dirty="0"/>
+              <a:t> </a:t>
+            </a:r>
+            <a:r>
+              <a:rPr lang="en-US" sz="1800" b="1" dirty="0">
+                <a:latin typeface="Courier New" panose="02070309020205020404" pitchFamily="49" charset="0"/>
+                <a:cs typeface="Courier New" panose="02070309020205020404" pitchFamily="49" charset="0"/>
+              </a:rPr>
+              <a:t>cat </a:t>
+            </a:r>
+            <a:r>
+              <a:rPr lang="en-US" sz="1800" b="1" dirty="0" err="1">
+                <a:latin typeface="Courier New" panose="02070309020205020404" pitchFamily="49" charset="0"/>
+                <a:cs typeface="Courier New" panose="02070309020205020404" pitchFamily="49" charset="0"/>
+              </a:rPr>
+              <a:t>list.txt</a:t>
+            </a:r>
+            <a:r>
+              <a:rPr lang="en-US" sz="1800" b="1" dirty="0">
+                <a:latin typeface="Courier New" panose="02070309020205020404" pitchFamily="49" charset="0"/>
+                <a:cs typeface="Courier New" panose="02070309020205020404" pitchFamily="49" charset="0"/>
+              </a:rPr>
+              <a:t> &gt;&gt; </a:t>
+            </a:r>
+            <a:r>
+              <a:rPr lang="en-US" sz="1800" b="1" dirty="0" err="1">
+                <a:latin typeface="Courier New" panose="02070309020205020404" pitchFamily="49" charset="0"/>
+                <a:cs typeface="Courier New" panose="02070309020205020404" pitchFamily="49" charset="0"/>
+              </a:rPr>
+              <a:t>masterlist.txt</a:t>
+            </a:r>
+            <a:r>
+              <a:rPr lang="en-US" sz="1800" dirty="0"/>
+              <a:t>)</a:t>
             </a:r>
           </a:p>
           <a:p>
@@ -10896,7 +10990,7 @@
         </p:nvCxnSpPr>
         <p:spPr>
           <a:xfrm>
-            <a:off x="3280576" y="2255517"/>
+            <a:off x="3151984" y="2255517"/>
             <a:ext cx="0" cy="539496"/>
           </a:xfrm>
           <a:prstGeom prst="straightConnector1">
@@ -10932,7 +11026,7 @@
         </p:nvSpPr>
         <p:spPr>
           <a:xfrm>
-            <a:off x="2922145" y="1967142"/>
+            <a:off x="2800699" y="1981430"/>
             <a:ext cx="716863" cy="248209"/>
           </a:xfrm>
           <a:prstGeom prst="rect">
@@ -11210,7 +11304,7 @@
             <a:pPr algn="ctr"/>
             <a:r>
               <a:rPr lang="en-US" dirty="0"/>
-              <a:t>More Redirection Examples</a:t>
+              <a:t>Redirection Examples</a:t>
             </a:r>
           </a:p>
         </p:txBody>
@@ -11257,7 +11351,7 @@
                 <a:latin typeface="Courier New" charset="0"/>
                 <a:cs typeface="Courier New" charset="0"/>
               </a:rPr>
-              <a:t>pip install </a:t>
+              <a:t>pip3 install </a:t>
             </a:r>
             <a:r>
               <a:rPr lang="en-US" b="1" dirty="0" err="1">
@@ -12374,7 +12468,7 @@
             <a:pPr algn="ctr"/>
             <a:r>
               <a:rPr lang="en-US" dirty="0"/>
-              <a:t>More pipe examples</a:t>
+              <a:t>pipe examples</a:t>
             </a:r>
           </a:p>
         </p:txBody>
@@ -29581,16 +29675,16 @@
                 <a:latin typeface="Courier New" panose="02070309020205020404" pitchFamily="49" charset="0"/>
                 <a:cs typeface="Courier New" panose="02070309020205020404" pitchFamily="49" charset="0"/>
               </a:rPr>
-              <a:t> -p $1; cd $1 }</a:t>
-            </a:r>
-          </a:p>
-          <a:p>
-            <a:r>
-              <a:rPr lang="en-US" b="1" dirty="0">
-                <a:latin typeface="Courier New" panose="02070309020205020404" pitchFamily="49" charset="0"/>
-                <a:cs typeface="Courier New" panose="02070309020205020404" pitchFamily="49" charset="0"/>
-              </a:rPr>
-              <a:t>cdl() { cd $1; ls}</a:t>
+              <a:t> -p "$1"; cd "$1";}</a:t>
+            </a:r>
+          </a:p>
+          <a:p>
+            <a:r>
+              <a:rPr lang="en-US" b="1" dirty="0">
+                <a:latin typeface="Courier New" panose="02070309020205020404" pitchFamily="49" charset="0"/>
+                <a:cs typeface="Courier New" panose="02070309020205020404" pitchFamily="49" charset="0"/>
+              </a:rPr>
+              <a:t>cdl() { cd "$1"; ls;}</a:t>
             </a:r>
           </a:p>
           <a:p>
@@ -29664,7 +29758,7 @@
                 <a:latin typeface="Courier New" panose="02070309020205020404" pitchFamily="49" charset="0"/>
                 <a:cs typeface="Courier New" panose="02070309020205020404" pitchFamily="49" charset="0"/>
               </a:rPr>
-              <a:t> $@ 2&gt;/dev/null }</a:t>
+              <a:t> "$@" 2&gt;/dev/null }</a:t>
             </a:r>
           </a:p>
           <a:p>
@@ -29694,7 +29788,7 @@
                 <a:latin typeface="Courier New" panose="02070309020205020404" pitchFamily="49" charset="0"/>
                 <a:cs typeface="Courier New" panose="02070309020205020404" pitchFamily="49" charset="0"/>
               </a:rPr>
-              <a:t> $@ 2&gt;/dev/null }</a:t>
+              <a:t> "$@" 2&gt;/dev/null }</a:t>
             </a:r>
           </a:p>
           <a:p>
@@ -29710,7 +29804,7 @@
                 <a:latin typeface="Courier New" panose="02070309020205020404" pitchFamily="49" charset="0"/>
                 <a:cs typeface="Courier New" panose="02070309020205020404" pitchFamily="49" charset="0"/>
               </a:rPr>
-              <a:t>() { help $@ || man $@ || $BROWSER "http://</a:t>
+              <a:t>() { help "$@" || man "$@" || $BROWSER "http://</a:t>
             </a:r>
             <a:r>
               <a:rPr lang="en-US" b="1" dirty="0" err="1">

</xml_diff>